<commit_message>
Include ramp in report diagram
</commit_message>
<xml_diff>
--- a/docs/diagrams/ug-report.pptx
+++ b/docs/diagrams/ug-report.pptx
@@ -261,7 +261,7 @@
           <a:p>
             <a:fld id="{D5F4EE06-143D-4C2F-8831-1CDA21FFE47B}" type="datetimeFigureOut">
               <a:rPr lang="en-SG" smtClean="0"/>
-              <a:t>13/9/2018</a:t>
+              <a:t>14/9/2018</a:t>
             </a:fld>
             <a:endParaRPr lang="en-SG"/>
           </a:p>
@@ -461,7 +461,7 @@
           <a:p>
             <a:fld id="{D5F4EE06-143D-4C2F-8831-1CDA21FFE47B}" type="datetimeFigureOut">
               <a:rPr lang="en-SG" smtClean="0"/>
-              <a:t>13/9/2018</a:t>
+              <a:t>14/9/2018</a:t>
             </a:fld>
             <a:endParaRPr lang="en-SG"/>
           </a:p>
@@ -671,7 +671,7 @@
           <a:p>
             <a:fld id="{D5F4EE06-143D-4C2F-8831-1CDA21FFE47B}" type="datetimeFigureOut">
               <a:rPr lang="en-SG" smtClean="0"/>
-              <a:t>13/9/2018</a:t>
+              <a:t>14/9/2018</a:t>
             </a:fld>
             <a:endParaRPr lang="en-SG"/>
           </a:p>
@@ -871,7 +871,7 @@
           <a:p>
             <a:fld id="{D5F4EE06-143D-4C2F-8831-1CDA21FFE47B}" type="datetimeFigureOut">
               <a:rPr lang="en-SG" smtClean="0"/>
-              <a:t>13/9/2018</a:t>
+              <a:t>14/9/2018</a:t>
             </a:fld>
             <a:endParaRPr lang="en-SG"/>
           </a:p>
@@ -1147,7 +1147,7 @@
           <a:p>
             <a:fld id="{D5F4EE06-143D-4C2F-8831-1CDA21FFE47B}" type="datetimeFigureOut">
               <a:rPr lang="en-SG" smtClean="0"/>
-              <a:t>13/9/2018</a:t>
+              <a:t>14/9/2018</a:t>
             </a:fld>
             <a:endParaRPr lang="en-SG"/>
           </a:p>
@@ -1415,7 +1415,7 @@
           <a:p>
             <a:fld id="{D5F4EE06-143D-4C2F-8831-1CDA21FFE47B}" type="datetimeFigureOut">
               <a:rPr lang="en-SG" smtClean="0"/>
-              <a:t>13/9/2018</a:t>
+              <a:t>14/9/2018</a:t>
             </a:fld>
             <a:endParaRPr lang="en-SG"/>
           </a:p>
@@ -1830,7 +1830,7 @@
           <a:p>
             <a:fld id="{D5F4EE06-143D-4C2F-8831-1CDA21FFE47B}" type="datetimeFigureOut">
               <a:rPr lang="en-SG" smtClean="0"/>
-              <a:t>13/9/2018</a:t>
+              <a:t>14/9/2018</a:t>
             </a:fld>
             <a:endParaRPr lang="en-SG"/>
           </a:p>
@@ -1972,7 +1972,7 @@
           <a:p>
             <a:fld id="{D5F4EE06-143D-4C2F-8831-1CDA21FFE47B}" type="datetimeFigureOut">
               <a:rPr lang="en-SG" smtClean="0"/>
-              <a:t>13/9/2018</a:t>
+              <a:t>14/9/2018</a:t>
             </a:fld>
             <a:endParaRPr lang="en-SG"/>
           </a:p>
@@ -2085,7 +2085,7 @@
           <a:p>
             <a:fld id="{D5F4EE06-143D-4C2F-8831-1CDA21FFE47B}" type="datetimeFigureOut">
               <a:rPr lang="en-SG" smtClean="0"/>
-              <a:t>13/9/2018</a:t>
+              <a:t>14/9/2018</a:t>
             </a:fld>
             <a:endParaRPr lang="en-SG"/>
           </a:p>
@@ -2398,7 +2398,7 @@
           <a:p>
             <a:fld id="{D5F4EE06-143D-4C2F-8831-1CDA21FFE47B}" type="datetimeFigureOut">
               <a:rPr lang="en-SG" smtClean="0"/>
-              <a:t>13/9/2018</a:t>
+              <a:t>14/9/2018</a:t>
             </a:fld>
             <a:endParaRPr lang="en-SG"/>
           </a:p>
@@ -2687,7 +2687,7 @@
           <a:p>
             <a:fld id="{D5F4EE06-143D-4C2F-8831-1CDA21FFE47B}" type="datetimeFigureOut">
               <a:rPr lang="en-SG" smtClean="0"/>
-              <a:t>13/9/2018</a:t>
+              <a:t>14/9/2018</a:t>
             </a:fld>
             <a:endParaRPr lang="en-SG"/>
           </a:p>
@@ -2930,7 +2930,7 @@
           <a:p>
             <a:fld id="{D5F4EE06-143D-4C2F-8831-1CDA21FFE47B}" type="datetimeFigureOut">
               <a:rPr lang="en-SG" smtClean="0"/>
-              <a:t>13/9/2018</a:t>
+              <a:t>14/9/2018</a:t>
             </a:fld>
             <a:endParaRPr lang="en-SG"/>
           </a:p>
@@ -3349,10 +3349,10 @@
       </p:grpSpPr>
       <p:grpSp>
         <p:nvGrpSpPr>
-          <p:cNvPr id="2" name="Group 1">
-            <a:extLst>
-              <a:ext uri="{FF2B5EF4-FFF2-40B4-BE49-F238E27FC236}">
-                <a16:creationId xmlns:a16="http://schemas.microsoft.com/office/drawing/2014/main" id="{AADF1D14-3A8F-4F9D-89A4-9AA3A16BCBA5}"/>
+          <p:cNvPr id="5" name="Group 4">
+            <a:extLst>
+              <a:ext uri="{FF2B5EF4-FFF2-40B4-BE49-F238E27FC236}">
+                <a16:creationId xmlns:a16="http://schemas.microsoft.com/office/drawing/2014/main" id="{B43A44B9-3612-4150-A44E-2A7BACC2B045}"/>
               </a:ext>
             </a:extLst>
           </p:cNvPr>
@@ -3361,10 +3361,10 @@
         </p:nvGrpSpPr>
         <p:grpSpPr>
           <a:xfrm>
-            <a:off x="0" y="-1023837"/>
-            <a:ext cx="12192000" cy="7881837"/>
-            <a:chOff x="0" y="-1023837"/>
-            <a:chExt cx="12192000" cy="7881837"/>
+            <a:off x="-1755436" y="-957072"/>
+            <a:ext cx="13947436" cy="7815072"/>
+            <a:chOff x="-1755436" y="-957072"/>
+            <a:chExt cx="13947436" cy="7815072"/>
           </a:xfrm>
         </p:grpSpPr>
         <p:pic>
@@ -3411,8 +3411,8 @@
           </p:nvSpPr>
           <p:spPr>
             <a:xfrm>
-              <a:off x="4617720" y="4094049"/>
-              <a:ext cx="1313181" cy="369332"/>
+              <a:off x="4646037" y="4094050"/>
+              <a:ext cx="739306" cy="369332"/>
             </a:xfrm>
             <a:prstGeom prst="rect">
               <a:avLst/>
@@ -3428,7 +3428,7 @@
               <a:pPr algn="ctr"/>
               <a:r>
                 <a:rPr lang="en-SG" b="1" dirty="0"/>
-                <a:t>Ramp Chart</a:t>
+                <a:t>Ramp</a:t>
               </a:r>
             </a:p>
           </p:txBody>
@@ -3447,7 +3447,7 @@
           </p:nvSpPr>
           <p:spPr>
             <a:xfrm>
-              <a:off x="9057409" y="-654505"/>
+              <a:off x="9057411" y="-587740"/>
               <a:ext cx="517237" cy="554182"/>
             </a:xfrm>
             <a:prstGeom prst="downArrow">
@@ -3499,7 +3499,7 @@
           </p:nvSpPr>
           <p:spPr>
             <a:xfrm>
-              <a:off x="8691340" y="-1023837"/>
+              <a:off x="8691342" y="-957072"/>
               <a:ext cx="1249381" cy="369332"/>
             </a:xfrm>
             <a:prstGeom prst="rect">
@@ -3623,7 +3623,7 @@
           </p:nvSpPr>
           <p:spPr>
             <a:xfrm rot="10800000">
-              <a:off x="5015693" y="3539866"/>
+              <a:off x="4757073" y="3539867"/>
               <a:ext cx="517237" cy="554182"/>
             </a:xfrm>
             <a:prstGeom prst="downArrow">
@@ -3834,6 +3834,94 @@
                 <a:rPr lang="en-SG" b="1" dirty="0"/>
                 <a:t>Chart Panel</a:t>
               </a:r>
+            </a:p>
+          </p:txBody>
+        </p:sp>
+        <p:sp>
+          <p:nvSpPr>
+            <p:cNvPr id="16" name="TextBox 15">
+              <a:extLst>
+                <a:ext uri="{FF2B5EF4-FFF2-40B4-BE49-F238E27FC236}">
+                  <a16:creationId xmlns:a16="http://schemas.microsoft.com/office/drawing/2014/main" id="{90DD3F11-A181-4D6B-B39E-4679AA9A63BD}"/>
+                </a:ext>
+              </a:extLst>
+            </p:cNvPr>
+            <p:cNvSpPr txBox="1"/>
+            <p:nvPr/>
+          </p:nvSpPr>
+          <p:spPr>
+            <a:xfrm>
+              <a:off x="-1755436" y="3096582"/>
+              <a:ext cx="1313181" cy="369332"/>
+            </a:xfrm>
+            <a:prstGeom prst="rect">
+              <a:avLst/>
+            </a:prstGeom>
+            <a:noFill/>
+          </p:spPr>
+          <p:txBody>
+            <a:bodyPr wrap="none" rtlCol="0">
+              <a:spAutoFit/>
+            </a:bodyPr>
+            <a:lstStyle/>
+            <a:p>
+              <a:pPr algn="ctr"/>
+              <a:r>
+                <a:rPr lang="en-SG" dirty="0"/>
+                <a:t>Ramp Chart</a:t>
+              </a:r>
+            </a:p>
+          </p:txBody>
+        </p:sp>
+        <p:sp>
+          <p:nvSpPr>
+            <p:cNvPr id="18" name="Arrow: Down 17">
+              <a:extLst>
+                <a:ext uri="{FF2B5EF4-FFF2-40B4-BE49-F238E27FC236}">
+                  <a16:creationId xmlns:a16="http://schemas.microsoft.com/office/drawing/2014/main" id="{0D427F96-5B4B-48FA-B69F-000E5460CBF1}"/>
+                </a:ext>
+              </a:extLst>
+            </p:cNvPr>
+            <p:cNvSpPr/>
+            <p:nvPr/>
+          </p:nvSpPr>
+          <p:spPr>
+            <a:xfrm rot="16200000">
+              <a:off x="-423782" y="3004157"/>
+              <a:ext cx="517237" cy="554182"/>
+            </a:xfrm>
+            <a:prstGeom prst="downArrow">
+              <a:avLst/>
+            </a:prstGeom>
+            <a:noFill/>
+            <a:ln w="38100">
+              <a:solidFill>
+                <a:schemeClr val="tx1"/>
+              </a:solidFill>
+            </a:ln>
+          </p:spPr>
+          <p:style>
+            <a:lnRef idx="2">
+              <a:schemeClr val="accent1">
+                <a:shade val="50000"/>
+              </a:schemeClr>
+            </a:lnRef>
+            <a:fillRef idx="1">
+              <a:schemeClr val="accent1"/>
+            </a:fillRef>
+            <a:effectRef idx="0">
+              <a:schemeClr val="accent1"/>
+            </a:effectRef>
+            <a:fontRef idx="minor">
+              <a:schemeClr val="lt1"/>
+            </a:fontRef>
+          </p:style>
+          <p:txBody>
+            <a:bodyPr rtlCol="0" anchor="ctr"/>
+            <a:lstStyle/>
+            <a:p>
+              <a:pPr algn="ctr"/>
+              <a:endParaRPr lang="en-SG"/>
             </a:p>
           </p:txBody>
         </p:sp>

</xml_diff>

<commit_message>
Resize the image to make the view cleaner
</commit_message>
<xml_diff>
--- a/docs/diagrams/ug-report.pptx
+++ b/docs/diagrams/ug-report.pptx
@@ -3349,10 +3349,10 @@
       </p:grpSpPr>
       <p:pic>
         <p:nvPicPr>
-          <p:cNvPr id="19" name="图片 18">
-            <a:extLst>
-              <a:ext uri="{FF2B5EF4-FFF2-40B4-BE49-F238E27FC236}">
-                <a16:creationId xmlns:a16="http://schemas.microsoft.com/office/drawing/2014/main" id="{79A7967F-D05C-423D-BDAE-55E1504B59B5}"/>
+          <p:cNvPr id="4" name="图片 3">
+            <a:extLst>
+              <a:ext uri="{FF2B5EF4-FFF2-40B4-BE49-F238E27FC236}">
+                <a16:creationId xmlns:a16="http://schemas.microsoft.com/office/drawing/2014/main" id="{790658E2-4B72-4B10-AE63-A77734D25760}"/>
               </a:ext>
             </a:extLst>
           </p:cNvPr>
@@ -3361,7 +3361,7 @@
           </p:cNvPicPr>
           <p:nvPr/>
         </p:nvPicPr>
-        <p:blipFill rotWithShape="1">
+        <p:blipFill>
           <a:blip r:embed="rId2">
             <a:extLst>
               <a:ext uri="{28A0092B-C50C-407E-A947-70E740481C1C}">
@@ -3369,13 +3369,14 @@
               </a:ext>
             </a:extLst>
           </a:blip>
-          <a:srcRect l="-90" t="1650" r="122"/>
-          <a:stretch/>
+          <a:stretch>
+            <a:fillRect/>
+          </a:stretch>
         </p:blipFill>
         <p:spPr>
           <a:xfrm>
-            <a:off x="0" y="0"/>
-            <a:ext cx="12217996" cy="5618374"/>
+            <a:off x="548207" y="0"/>
+            <a:ext cx="9728068" cy="5302028"/>
           </a:xfrm>
           <a:prstGeom prst="rect">
             <a:avLst/>
@@ -3396,7 +3397,7 @@
         </p:nvSpPr>
         <p:spPr>
           <a:xfrm>
-            <a:off x="4287819" y="3808767"/>
+            <a:off x="3901320" y="3554244"/>
             <a:ext cx="739306" cy="369332"/>
           </a:xfrm>
           <a:prstGeom prst="rect">
@@ -3432,7 +3433,7 @@
         </p:nvSpPr>
         <p:spPr>
           <a:xfrm>
-            <a:off x="8491803" y="-601935"/>
+            <a:off x="7530269" y="-591128"/>
             <a:ext cx="517237" cy="554182"/>
           </a:xfrm>
           <a:prstGeom prst="downArrow">
@@ -3484,7 +3485,7 @@
         </p:nvSpPr>
         <p:spPr>
           <a:xfrm>
-            <a:off x="8125734" y="-971267"/>
+            <a:off x="7164200" y="-960460"/>
             <a:ext cx="1249381" cy="369332"/>
           </a:xfrm>
           <a:prstGeom prst="rect">
@@ -3520,7 +3521,7 @@
         </p:nvSpPr>
         <p:spPr>
           <a:xfrm rot="5400000">
-            <a:off x="1380646" y="4464352"/>
+            <a:off x="1699108" y="4089954"/>
             <a:ext cx="517237" cy="554182"/>
           </a:xfrm>
           <a:prstGeom prst="downArrow">
@@ -3572,7 +3573,7 @@
         </p:nvSpPr>
         <p:spPr>
           <a:xfrm>
-            <a:off x="1916356" y="4556777"/>
+            <a:off x="2234818" y="4182379"/>
             <a:ext cx="1777538" cy="369332"/>
           </a:xfrm>
           <a:prstGeom prst="rect">
@@ -3608,7 +3609,7 @@
         </p:nvSpPr>
         <p:spPr>
           <a:xfrm rot="10800000">
-            <a:off x="4398855" y="3254584"/>
+            <a:off x="4012356" y="3000061"/>
             <a:ext cx="517237" cy="554182"/>
           </a:xfrm>
           <a:prstGeom prst="downArrow">
@@ -3836,7 +3837,7 @@
         </p:nvSpPr>
         <p:spPr>
           <a:xfrm>
-            <a:off x="-1791948" y="2163328"/>
+            <a:off x="-1313181" y="1899377"/>
             <a:ext cx="1313181" cy="369332"/>
           </a:xfrm>
           <a:prstGeom prst="rect">
@@ -3872,7 +3873,7 @@
         </p:nvSpPr>
         <p:spPr>
           <a:xfrm rot="16200000">
-            <a:off x="-460294" y="2070903"/>
+            <a:off x="18473" y="1806952"/>
             <a:ext cx="517237" cy="554182"/>
           </a:xfrm>
           <a:prstGeom prst="downArrow">

</xml_diff>

<commit_message>
[#396] Provide a link to repo even when not grouped by repo (#426)
Link to the repository is only available in the chart view when the
`group by repo/branch` is selected, represented by an embedded
hyperlink in the group title.

This causes inconvenience to the users who want to visit the repository
when the authors are listed individually, as the link to repository
cannot be found. 

Let's move the hyperlink in the group title to the individual author's
code view, and also add a button next to every author's name in the
chart view, to ensure consistent navigability to author's repository.
</commit_message>
<xml_diff>
--- a/docs/diagrams/ug-report.pptx
+++ b/docs/diagrams/ug-report.pptx
@@ -261,7 +261,7 @@
           <a:p>
             <a:fld id="{D5F4EE06-143D-4C2F-8831-1CDA21FFE47B}" type="datetimeFigureOut">
               <a:rPr lang="en-SG" smtClean="0"/>
-              <a:t>14/9/2018</a:t>
+              <a:t>20/12/2018</a:t>
             </a:fld>
             <a:endParaRPr lang="en-SG"/>
           </a:p>
@@ -461,7 +461,7 @@
           <a:p>
             <a:fld id="{D5F4EE06-143D-4C2F-8831-1CDA21FFE47B}" type="datetimeFigureOut">
               <a:rPr lang="en-SG" smtClean="0"/>
-              <a:t>14/9/2018</a:t>
+              <a:t>20/12/2018</a:t>
             </a:fld>
             <a:endParaRPr lang="en-SG"/>
           </a:p>
@@ -671,7 +671,7 @@
           <a:p>
             <a:fld id="{D5F4EE06-143D-4C2F-8831-1CDA21FFE47B}" type="datetimeFigureOut">
               <a:rPr lang="en-SG" smtClean="0"/>
-              <a:t>14/9/2018</a:t>
+              <a:t>20/12/2018</a:t>
             </a:fld>
             <a:endParaRPr lang="en-SG"/>
           </a:p>
@@ -871,7 +871,7 @@
           <a:p>
             <a:fld id="{D5F4EE06-143D-4C2F-8831-1CDA21FFE47B}" type="datetimeFigureOut">
               <a:rPr lang="en-SG" smtClean="0"/>
-              <a:t>14/9/2018</a:t>
+              <a:t>20/12/2018</a:t>
             </a:fld>
             <a:endParaRPr lang="en-SG"/>
           </a:p>
@@ -1147,7 +1147,7 @@
           <a:p>
             <a:fld id="{D5F4EE06-143D-4C2F-8831-1CDA21FFE47B}" type="datetimeFigureOut">
               <a:rPr lang="en-SG" smtClean="0"/>
-              <a:t>14/9/2018</a:t>
+              <a:t>20/12/2018</a:t>
             </a:fld>
             <a:endParaRPr lang="en-SG"/>
           </a:p>
@@ -1415,7 +1415,7 @@
           <a:p>
             <a:fld id="{D5F4EE06-143D-4C2F-8831-1CDA21FFE47B}" type="datetimeFigureOut">
               <a:rPr lang="en-SG" smtClean="0"/>
-              <a:t>14/9/2018</a:t>
+              <a:t>20/12/2018</a:t>
             </a:fld>
             <a:endParaRPr lang="en-SG"/>
           </a:p>
@@ -1830,7 +1830,7 @@
           <a:p>
             <a:fld id="{D5F4EE06-143D-4C2F-8831-1CDA21FFE47B}" type="datetimeFigureOut">
               <a:rPr lang="en-SG" smtClean="0"/>
-              <a:t>14/9/2018</a:t>
+              <a:t>20/12/2018</a:t>
             </a:fld>
             <a:endParaRPr lang="en-SG"/>
           </a:p>
@@ -1972,7 +1972,7 @@
           <a:p>
             <a:fld id="{D5F4EE06-143D-4C2F-8831-1CDA21FFE47B}" type="datetimeFigureOut">
               <a:rPr lang="en-SG" smtClean="0"/>
-              <a:t>14/9/2018</a:t>
+              <a:t>20/12/2018</a:t>
             </a:fld>
             <a:endParaRPr lang="en-SG"/>
           </a:p>
@@ -2085,7 +2085,7 @@
           <a:p>
             <a:fld id="{D5F4EE06-143D-4C2F-8831-1CDA21FFE47B}" type="datetimeFigureOut">
               <a:rPr lang="en-SG" smtClean="0"/>
-              <a:t>14/9/2018</a:t>
+              <a:t>20/12/2018</a:t>
             </a:fld>
             <a:endParaRPr lang="en-SG"/>
           </a:p>
@@ -2398,7 +2398,7 @@
           <a:p>
             <a:fld id="{D5F4EE06-143D-4C2F-8831-1CDA21FFE47B}" type="datetimeFigureOut">
               <a:rPr lang="en-SG" smtClean="0"/>
-              <a:t>14/9/2018</a:t>
+              <a:t>20/12/2018</a:t>
             </a:fld>
             <a:endParaRPr lang="en-SG"/>
           </a:p>
@@ -2687,7 +2687,7 @@
           <a:p>
             <a:fld id="{D5F4EE06-143D-4C2F-8831-1CDA21FFE47B}" type="datetimeFigureOut">
               <a:rPr lang="en-SG" smtClean="0"/>
-              <a:t>14/9/2018</a:t>
+              <a:t>20/12/2018</a:t>
             </a:fld>
             <a:endParaRPr lang="en-SG"/>
           </a:p>
@@ -2930,7 +2930,7 @@
           <a:p>
             <a:fld id="{D5F4EE06-143D-4C2F-8831-1CDA21FFE47B}" type="datetimeFigureOut">
               <a:rPr lang="en-SG" smtClean="0"/>
-              <a:t>14/9/2018</a:t>
+              <a:t>20/12/2018</a:t>
             </a:fld>
             <a:endParaRPr lang="en-SG"/>
           </a:p>
@@ -3347,585 +3347,570 @@
           <a:chExt cx="0" cy="0"/>
         </a:xfrm>
       </p:grpSpPr>
-      <p:grpSp>
-        <p:nvGrpSpPr>
-          <p:cNvPr id="5" name="Group 4">
-            <a:extLst>
-              <a:ext uri="{FF2B5EF4-FFF2-40B4-BE49-F238E27FC236}">
-                <a16:creationId xmlns:a16="http://schemas.microsoft.com/office/drawing/2014/main" id="{B43A44B9-3612-4150-A44E-2A7BACC2B045}"/>
-              </a:ext>
-            </a:extLst>
-          </p:cNvPr>
-          <p:cNvGrpSpPr/>
+      <p:pic>
+        <p:nvPicPr>
+          <p:cNvPr id="4" name="图片 3">
+            <a:extLst>
+              <a:ext uri="{FF2B5EF4-FFF2-40B4-BE49-F238E27FC236}">
+                <a16:creationId xmlns:a16="http://schemas.microsoft.com/office/drawing/2014/main" id="{790658E2-4B72-4B10-AE63-A77734D25760}"/>
+              </a:ext>
+            </a:extLst>
+          </p:cNvPr>
+          <p:cNvPicPr>
+            <a:picLocks noChangeAspect="1"/>
+          </p:cNvPicPr>
           <p:nvPr/>
-        </p:nvGrpSpPr>
-        <p:grpSpPr>
+        </p:nvPicPr>
+        <p:blipFill>
+          <a:blip r:embed="rId2">
+            <a:extLst>
+              <a:ext uri="{28A0092B-C50C-407E-A947-70E740481C1C}">
+                <a14:useLocalDpi xmlns:a14="http://schemas.microsoft.com/office/drawing/2010/main" val="0"/>
+              </a:ext>
+            </a:extLst>
+          </a:blip>
+          <a:stretch>
+            <a:fillRect/>
+          </a:stretch>
+        </p:blipFill>
+        <p:spPr>
           <a:xfrm>
-            <a:off x="-1755436" y="-957072"/>
-            <a:ext cx="13947436" cy="7815072"/>
-            <a:chOff x="-1755436" y="-957072"/>
-            <a:chExt cx="13947436" cy="7815072"/>
+            <a:off x="548207" y="0"/>
+            <a:ext cx="9728068" cy="5302028"/>
           </a:xfrm>
-        </p:grpSpPr>
-        <p:pic>
-          <p:nvPicPr>
-            <p:cNvPr id="4" name="Picture 3">
-              <a:extLst>
-                <a:ext uri="{FF2B5EF4-FFF2-40B4-BE49-F238E27FC236}">
-                  <a16:creationId xmlns:a16="http://schemas.microsoft.com/office/drawing/2014/main" id="{A49FF059-87F9-431D-873B-567890A47D18}"/>
-                </a:ext>
-              </a:extLst>
-            </p:cNvPr>
-            <p:cNvPicPr>
-              <a:picLocks noChangeAspect="1"/>
-            </p:cNvPicPr>
-            <p:nvPr/>
-          </p:nvPicPr>
-          <p:blipFill>
-            <a:blip r:embed="rId2"/>
-            <a:stretch>
-              <a:fillRect/>
-            </a:stretch>
-          </p:blipFill>
-          <p:spPr>
-            <a:xfrm>
-              <a:off x="0" y="0"/>
-              <a:ext cx="12192000" cy="6858000"/>
-            </a:xfrm>
-            <a:prstGeom prst="rect">
-              <a:avLst/>
-            </a:prstGeom>
-          </p:spPr>
-        </p:pic>
-        <p:sp>
-          <p:nvSpPr>
-            <p:cNvPr id="7" name="TextBox 6">
-              <a:extLst>
-                <a:ext uri="{FF2B5EF4-FFF2-40B4-BE49-F238E27FC236}">
-                  <a16:creationId xmlns:a16="http://schemas.microsoft.com/office/drawing/2014/main" id="{7A204B77-DB19-44AC-B9D4-FD866571438D}"/>
-                </a:ext>
-              </a:extLst>
-            </p:cNvPr>
-            <p:cNvSpPr txBox="1"/>
-            <p:nvPr/>
-          </p:nvSpPr>
-          <p:spPr>
-            <a:xfrm>
-              <a:off x="4646037" y="4094050"/>
-              <a:ext cx="739306" cy="369332"/>
-            </a:xfrm>
-            <a:prstGeom prst="rect">
-              <a:avLst/>
-            </a:prstGeom>
-            <a:noFill/>
-          </p:spPr>
-          <p:txBody>
-            <a:bodyPr wrap="none" rtlCol="0">
-              <a:spAutoFit/>
-            </a:bodyPr>
-            <a:lstStyle/>
-            <a:p>
-              <a:pPr algn="ctr"/>
-              <a:r>
-                <a:rPr lang="en-SG" b="1" dirty="0"/>
-                <a:t>Ramp</a:t>
-              </a:r>
-            </a:p>
-          </p:txBody>
-        </p:sp>
-        <p:sp>
-          <p:nvSpPr>
-            <p:cNvPr id="8" name="Arrow: Down 7">
-              <a:extLst>
-                <a:ext uri="{FF2B5EF4-FFF2-40B4-BE49-F238E27FC236}">
-                  <a16:creationId xmlns:a16="http://schemas.microsoft.com/office/drawing/2014/main" id="{E70E593E-34F8-4719-AC5C-AA5555C17A19}"/>
-                </a:ext>
-              </a:extLst>
-            </p:cNvPr>
-            <p:cNvSpPr/>
-            <p:nvPr/>
-          </p:nvSpPr>
-          <p:spPr>
-            <a:xfrm>
-              <a:off x="9057411" y="-587740"/>
-              <a:ext cx="517237" cy="554182"/>
-            </a:xfrm>
-            <a:prstGeom prst="downArrow">
-              <a:avLst/>
-            </a:prstGeom>
-            <a:noFill/>
-            <a:ln w="38100">
-              <a:solidFill>
-                <a:schemeClr val="tx1"/>
-              </a:solidFill>
-            </a:ln>
-          </p:spPr>
-          <p:style>
-            <a:lnRef idx="2">
-              <a:schemeClr val="accent1">
-                <a:shade val="50000"/>
-              </a:schemeClr>
-            </a:lnRef>
-            <a:fillRef idx="1">
-              <a:schemeClr val="accent1"/>
-            </a:fillRef>
-            <a:effectRef idx="0">
-              <a:schemeClr val="accent1"/>
-            </a:effectRef>
-            <a:fontRef idx="minor">
-              <a:schemeClr val="lt1"/>
-            </a:fontRef>
-          </p:style>
-          <p:txBody>
-            <a:bodyPr rtlCol="0" anchor="ctr"/>
-            <a:lstStyle/>
-            <a:p>
-              <a:pPr algn="ctr"/>
-              <a:endParaRPr lang="en-SG"/>
-            </a:p>
-          </p:txBody>
-        </p:sp>
-        <p:sp>
-          <p:nvSpPr>
-            <p:cNvPr id="9" name="TextBox 8">
-              <a:extLst>
-                <a:ext uri="{FF2B5EF4-FFF2-40B4-BE49-F238E27FC236}">
-                  <a16:creationId xmlns:a16="http://schemas.microsoft.com/office/drawing/2014/main" id="{E5951C4D-2615-492C-8B4C-6400FC79A33D}"/>
-                </a:ext>
-              </a:extLst>
-            </p:cNvPr>
-            <p:cNvSpPr txBox="1"/>
-            <p:nvPr/>
-          </p:nvSpPr>
-          <p:spPr>
-            <a:xfrm>
-              <a:off x="8691342" y="-957072"/>
-              <a:ext cx="1249381" cy="369332"/>
-            </a:xfrm>
-            <a:prstGeom prst="rect">
-              <a:avLst/>
-            </a:prstGeom>
-            <a:noFill/>
-          </p:spPr>
-          <p:txBody>
-            <a:bodyPr wrap="none" rtlCol="0">
-              <a:spAutoFit/>
-            </a:bodyPr>
-            <a:lstStyle/>
-            <a:p>
-              <a:pPr algn="ctr"/>
-              <a:r>
-                <a:rPr lang="en-SG" b="1" dirty="0"/>
-                <a:t>Code Panel</a:t>
-              </a:r>
-            </a:p>
-          </p:txBody>
-        </p:sp>
-        <p:sp>
-          <p:nvSpPr>
-            <p:cNvPr id="10" name="Arrow: Down 9">
-              <a:extLst>
-                <a:ext uri="{FF2B5EF4-FFF2-40B4-BE49-F238E27FC236}">
-                  <a16:creationId xmlns:a16="http://schemas.microsoft.com/office/drawing/2014/main" id="{4B5FA1E7-2641-418D-9855-87AEAC7ED7B2}"/>
-                </a:ext>
-              </a:extLst>
-            </p:cNvPr>
-            <p:cNvSpPr/>
-            <p:nvPr/>
-          </p:nvSpPr>
-          <p:spPr>
-            <a:xfrm rot="5400000">
-              <a:off x="2304472" y="4992254"/>
-              <a:ext cx="517237" cy="554182"/>
-            </a:xfrm>
-            <a:prstGeom prst="downArrow">
-              <a:avLst/>
-            </a:prstGeom>
-            <a:noFill/>
-            <a:ln w="38100">
-              <a:solidFill>
-                <a:schemeClr val="tx1"/>
-              </a:solidFill>
-            </a:ln>
-          </p:spPr>
-          <p:style>
-            <a:lnRef idx="2">
-              <a:schemeClr val="accent1">
-                <a:shade val="50000"/>
-              </a:schemeClr>
-            </a:lnRef>
-            <a:fillRef idx="1">
-              <a:schemeClr val="accent1"/>
-            </a:fillRef>
-            <a:effectRef idx="0">
-              <a:schemeClr val="accent1"/>
-            </a:effectRef>
-            <a:fontRef idx="minor">
-              <a:schemeClr val="lt1"/>
-            </a:fontRef>
-          </p:style>
-          <p:txBody>
-            <a:bodyPr rtlCol="0" anchor="ctr"/>
-            <a:lstStyle/>
-            <a:p>
-              <a:pPr algn="ctr"/>
-              <a:endParaRPr lang="en-SG"/>
-            </a:p>
-          </p:txBody>
-        </p:sp>
-        <p:sp>
-          <p:nvSpPr>
-            <p:cNvPr id="11" name="TextBox 10">
-              <a:extLst>
-                <a:ext uri="{FF2B5EF4-FFF2-40B4-BE49-F238E27FC236}">
-                  <a16:creationId xmlns:a16="http://schemas.microsoft.com/office/drawing/2014/main" id="{A0C18F20-A329-4A19-9568-DDF540B86597}"/>
-                </a:ext>
-              </a:extLst>
-            </p:cNvPr>
-            <p:cNvSpPr txBox="1"/>
-            <p:nvPr/>
-          </p:nvSpPr>
-          <p:spPr>
-            <a:xfrm>
-              <a:off x="2840182" y="5084679"/>
-              <a:ext cx="1777538" cy="369332"/>
-            </a:xfrm>
-            <a:prstGeom prst="rect">
-              <a:avLst/>
-            </a:prstGeom>
-            <a:noFill/>
-          </p:spPr>
-          <p:txBody>
-            <a:bodyPr wrap="none" rtlCol="0">
-              <a:spAutoFit/>
-            </a:bodyPr>
-            <a:lstStyle/>
-            <a:p>
-              <a:pPr algn="ctr"/>
-              <a:r>
-                <a:rPr lang="en-SG" b="1" dirty="0"/>
-                <a:t>Contribution Bar</a:t>
-              </a:r>
-            </a:p>
-          </p:txBody>
-        </p:sp>
-        <p:sp>
-          <p:nvSpPr>
-            <p:cNvPr id="13" name="Arrow: Down 12">
-              <a:extLst>
-                <a:ext uri="{FF2B5EF4-FFF2-40B4-BE49-F238E27FC236}">
-                  <a16:creationId xmlns:a16="http://schemas.microsoft.com/office/drawing/2014/main" id="{513B7AA3-D8C6-4818-8677-73EFEDACCEF6}"/>
-                </a:ext>
-              </a:extLst>
-            </p:cNvPr>
-            <p:cNvSpPr/>
-            <p:nvPr/>
-          </p:nvSpPr>
-          <p:spPr>
-            <a:xfrm rot="10800000">
-              <a:off x="4757073" y="3539867"/>
-              <a:ext cx="517237" cy="554182"/>
-            </a:xfrm>
-            <a:prstGeom prst="downArrow">
-              <a:avLst/>
-            </a:prstGeom>
-            <a:noFill/>
-            <a:ln w="38100">
-              <a:solidFill>
-                <a:schemeClr val="tx1"/>
-              </a:solidFill>
-            </a:ln>
-          </p:spPr>
-          <p:style>
-            <a:lnRef idx="2">
-              <a:schemeClr val="accent1">
-                <a:shade val="50000"/>
-              </a:schemeClr>
-            </a:lnRef>
-            <a:fillRef idx="1">
-              <a:schemeClr val="accent1"/>
-            </a:fillRef>
-            <a:effectRef idx="0">
-              <a:schemeClr val="accent1"/>
-            </a:effectRef>
-            <a:fontRef idx="minor">
-              <a:schemeClr val="lt1"/>
-            </a:fontRef>
-          </p:style>
-          <p:txBody>
-            <a:bodyPr rtlCol="0" anchor="ctr"/>
-            <a:lstStyle/>
-            <a:p>
-              <a:pPr algn="ctr"/>
-              <a:endParaRPr lang="en-SG"/>
-            </a:p>
-          </p:txBody>
-        </p:sp>
-        <p:sp>
-          <p:nvSpPr>
-            <p:cNvPr id="14" name="TextBox 13">
-              <a:extLst>
-                <a:ext uri="{FF2B5EF4-FFF2-40B4-BE49-F238E27FC236}">
-                  <a16:creationId xmlns:a16="http://schemas.microsoft.com/office/drawing/2014/main" id="{61C6FB55-A0EF-4B70-9579-2E3633BAB17C}"/>
-                </a:ext>
-              </a:extLst>
-            </p:cNvPr>
-            <p:cNvSpPr txBox="1"/>
-            <p:nvPr/>
-          </p:nvSpPr>
-          <p:spPr>
-            <a:xfrm>
-              <a:off x="111927" y="37190"/>
-              <a:ext cx="900503" cy="369332"/>
-            </a:xfrm>
-            <a:prstGeom prst="rect">
-              <a:avLst/>
-            </a:prstGeom>
-            <a:noFill/>
-          </p:spPr>
-          <p:txBody>
-            <a:bodyPr wrap="none" rtlCol="0">
-              <a:spAutoFit/>
-            </a:bodyPr>
-            <a:lstStyle/>
-            <a:p>
-              <a:pPr algn="ctr"/>
-              <a:r>
-                <a:rPr lang="en-SG" b="1" dirty="0"/>
-                <a:t>Toolbar</a:t>
-              </a:r>
-            </a:p>
-          </p:txBody>
-        </p:sp>
-        <p:sp>
-          <p:nvSpPr>
-            <p:cNvPr id="15" name="Arrow: Down 14">
-              <a:extLst>
-                <a:ext uri="{FF2B5EF4-FFF2-40B4-BE49-F238E27FC236}">
-                  <a16:creationId xmlns:a16="http://schemas.microsoft.com/office/drawing/2014/main" id="{C9086935-6371-4258-8020-0D1D97F121AB}"/>
-                </a:ext>
-              </a:extLst>
-            </p:cNvPr>
-            <p:cNvSpPr/>
-            <p:nvPr/>
-          </p:nvSpPr>
-          <p:spPr>
-            <a:xfrm rot="16200000">
-              <a:off x="303561" y="388050"/>
-              <a:ext cx="517237" cy="554182"/>
-            </a:xfrm>
-            <a:prstGeom prst="downArrow">
-              <a:avLst/>
-            </a:prstGeom>
-            <a:noFill/>
-            <a:ln w="38100">
-              <a:solidFill>
-                <a:schemeClr val="tx1"/>
-              </a:solidFill>
-            </a:ln>
-          </p:spPr>
-          <p:style>
-            <a:lnRef idx="2">
-              <a:schemeClr val="accent1">
-                <a:shade val="50000"/>
-              </a:schemeClr>
-            </a:lnRef>
-            <a:fillRef idx="1">
-              <a:schemeClr val="accent1"/>
-            </a:fillRef>
-            <a:effectRef idx="0">
-              <a:schemeClr val="accent1"/>
-            </a:effectRef>
-            <a:fontRef idx="minor">
-              <a:schemeClr val="lt1"/>
-            </a:fontRef>
-          </p:style>
-          <p:txBody>
-            <a:bodyPr rtlCol="0" anchor="ctr"/>
-            <a:lstStyle/>
-            <a:p>
-              <a:pPr algn="ctr"/>
-              <a:endParaRPr lang="en-SG"/>
-            </a:p>
-          </p:txBody>
-        </p:sp>
-        <p:sp>
-          <p:nvSpPr>
-            <p:cNvPr id="12" name="Arrow: Down 11">
-              <a:extLst>
-                <a:ext uri="{FF2B5EF4-FFF2-40B4-BE49-F238E27FC236}">
-                  <a16:creationId xmlns:a16="http://schemas.microsoft.com/office/drawing/2014/main" id="{6E5DA74A-713D-4962-8BB0-EB6D058497FA}"/>
-                </a:ext>
-              </a:extLst>
-            </p:cNvPr>
-            <p:cNvSpPr/>
-            <p:nvPr/>
-          </p:nvSpPr>
-          <p:spPr>
-            <a:xfrm>
-              <a:off x="2875970" y="-587740"/>
-              <a:ext cx="517237" cy="554182"/>
-            </a:xfrm>
-            <a:prstGeom prst="downArrow">
-              <a:avLst/>
-            </a:prstGeom>
-            <a:noFill/>
-            <a:ln w="38100">
-              <a:solidFill>
-                <a:schemeClr val="tx1"/>
-              </a:solidFill>
-            </a:ln>
-          </p:spPr>
-          <p:style>
-            <a:lnRef idx="2">
-              <a:schemeClr val="accent1">
-                <a:shade val="50000"/>
-              </a:schemeClr>
-            </a:lnRef>
-            <a:fillRef idx="1">
-              <a:schemeClr val="accent1"/>
-            </a:fillRef>
-            <a:effectRef idx="0">
-              <a:schemeClr val="accent1"/>
-            </a:effectRef>
-            <a:fontRef idx="minor">
-              <a:schemeClr val="lt1"/>
-            </a:fontRef>
-          </p:style>
-          <p:txBody>
-            <a:bodyPr rtlCol="0" anchor="ctr"/>
-            <a:lstStyle/>
-            <a:p>
-              <a:pPr algn="ctr"/>
-              <a:endParaRPr lang="en-SG"/>
-            </a:p>
-          </p:txBody>
-        </p:sp>
-        <p:sp>
-          <p:nvSpPr>
-            <p:cNvPr id="17" name="TextBox 16">
-              <a:extLst>
-                <a:ext uri="{FF2B5EF4-FFF2-40B4-BE49-F238E27FC236}">
-                  <a16:creationId xmlns:a16="http://schemas.microsoft.com/office/drawing/2014/main" id="{6ADBC469-4AA9-4B94-927B-3BC4FF0DB4CD}"/>
-                </a:ext>
-              </a:extLst>
-            </p:cNvPr>
-            <p:cNvSpPr txBox="1"/>
-            <p:nvPr/>
-          </p:nvSpPr>
-          <p:spPr>
-            <a:xfrm>
-              <a:off x="2491467" y="-957072"/>
-              <a:ext cx="1286250" cy="369332"/>
-            </a:xfrm>
-            <a:prstGeom prst="rect">
-              <a:avLst/>
-            </a:prstGeom>
-            <a:noFill/>
-          </p:spPr>
-          <p:txBody>
-            <a:bodyPr wrap="none" rtlCol="0">
-              <a:spAutoFit/>
-            </a:bodyPr>
-            <a:lstStyle/>
-            <a:p>
-              <a:pPr algn="ctr"/>
-              <a:r>
-                <a:rPr lang="en-SG" b="1" dirty="0"/>
-                <a:t>Chart Panel</a:t>
-              </a:r>
-            </a:p>
-          </p:txBody>
-        </p:sp>
-        <p:sp>
-          <p:nvSpPr>
-            <p:cNvPr id="16" name="TextBox 15">
-              <a:extLst>
-                <a:ext uri="{FF2B5EF4-FFF2-40B4-BE49-F238E27FC236}">
-                  <a16:creationId xmlns:a16="http://schemas.microsoft.com/office/drawing/2014/main" id="{90DD3F11-A181-4D6B-B39E-4679AA9A63BD}"/>
-                </a:ext>
-              </a:extLst>
-            </p:cNvPr>
-            <p:cNvSpPr txBox="1"/>
-            <p:nvPr/>
-          </p:nvSpPr>
-          <p:spPr>
-            <a:xfrm>
-              <a:off x="-1755436" y="3096582"/>
-              <a:ext cx="1313181" cy="369332"/>
-            </a:xfrm>
-            <a:prstGeom prst="rect">
-              <a:avLst/>
-            </a:prstGeom>
-            <a:noFill/>
-          </p:spPr>
-          <p:txBody>
-            <a:bodyPr wrap="none" rtlCol="0">
-              <a:spAutoFit/>
-            </a:bodyPr>
-            <a:lstStyle/>
-            <a:p>
-              <a:pPr algn="ctr"/>
-              <a:r>
-                <a:rPr lang="en-SG" dirty="0"/>
-                <a:t>Ramp Chart</a:t>
-              </a:r>
-            </a:p>
-          </p:txBody>
-        </p:sp>
-        <p:sp>
-          <p:nvSpPr>
-            <p:cNvPr id="18" name="Arrow: Down 17">
-              <a:extLst>
-                <a:ext uri="{FF2B5EF4-FFF2-40B4-BE49-F238E27FC236}">
-                  <a16:creationId xmlns:a16="http://schemas.microsoft.com/office/drawing/2014/main" id="{0D427F96-5B4B-48FA-B69F-000E5460CBF1}"/>
-                </a:ext>
-              </a:extLst>
-            </p:cNvPr>
-            <p:cNvSpPr/>
-            <p:nvPr/>
-          </p:nvSpPr>
-          <p:spPr>
-            <a:xfrm rot="16200000">
-              <a:off x="-423782" y="3004157"/>
-              <a:ext cx="517237" cy="554182"/>
-            </a:xfrm>
-            <a:prstGeom prst="downArrow">
-              <a:avLst/>
-            </a:prstGeom>
-            <a:noFill/>
-            <a:ln w="38100">
-              <a:solidFill>
-                <a:schemeClr val="tx1"/>
-              </a:solidFill>
-            </a:ln>
-          </p:spPr>
-          <p:style>
-            <a:lnRef idx="2">
-              <a:schemeClr val="accent1">
-                <a:shade val="50000"/>
-              </a:schemeClr>
-            </a:lnRef>
-            <a:fillRef idx="1">
-              <a:schemeClr val="accent1"/>
-            </a:fillRef>
-            <a:effectRef idx="0">
-              <a:schemeClr val="accent1"/>
-            </a:effectRef>
-            <a:fontRef idx="minor">
-              <a:schemeClr val="lt1"/>
-            </a:fontRef>
-          </p:style>
-          <p:txBody>
-            <a:bodyPr rtlCol="0" anchor="ctr"/>
-            <a:lstStyle/>
-            <a:p>
-              <a:pPr algn="ctr"/>
-              <a:endParaRPr lang="en-SG"/>
-            </a:p>
-          </p:txBody>
-        </p:sp>
-      </p:grpSp>
+          <a:prstGeom prst="rect">
+            <a:avLst/>
+          </a:prstGeom>
+        </p:spPr>
+      </p:pic>
+      <p:sp>
+        <p:nvSpPr>
+          <p:cNvPr id="7" name="TextBox 6">
+            <a:extLst>
+              <a:ext uri="{FF2B5EF4-FFF2-40B4-BE49-F238E27FC236}">
+                <a16:creationId xmlns:a16="http://schemas.microsoft.com/office/drawing/2014/main" id="{7A204B77-DB19-44AC-B9D4-FD866571438D}"/>
+              </a:ext>
+            </a:extLst>
+          </p:cNvPr>
+          <p:cNvSpPr txBox="1"/>
+          <p:nvPr/>
+        </p:nvSpPr>
+        <p:spPr>
+          <a:xfrm>
+            <a:off x="3901320" y="3554244"/>
+            <a:ext cx="739306" cy="369332"/>
+          </a:xfrm>
+          <a:prstGeom prst="rect">
+            <a:avLst/>
+          </a:prstGeom>
+          <a:noFill/>
+        </p:spPr>
+        <p:txBody>
+          <a:bodyPr wrap="none" rtlCol="0">
+            <a:spAutoFit/>
+          </a:bodyPr>
+          <a:lstStyle/>
+          <a:p>
+            <a:pPr algn="ctr"/>
+            <a:r>
+              <a:rPr lang="en-SG" b="1" dirty="0"/>
+              <a:t>Ramp</a:t>
+            </a:r>
+          </a:p>
+        </p:txBody>
+      </p:sp>
+      <p:sp>
+        <p:nvSpPr>
+          <p:cNvPr id="8" name="Arrow: Down 7">
+            <a:extLst>
+              <a:ext uri="{FF2B5EF4-FFF2-40B4-BE49-F238E27FC236}">
+                <a16:creationId xmlns:a16="http://schemas.microsoft.com/office/drawing/2014/main" id="{E70E593E-34F8-4719-AC5C-AA5555C17A19}"/>
+              </a:ext>
+            </a:extLst>
+          </p:cNvPr>
+          <p:cNvSpPr/>
+          <p:nvPr/>
+        </p:nvSpPr>
+        <p:spPr>
+          <a:xfrm>
+            <a:off x="7530269" y="-591128"/>
+            <a:ext cx="517237" cy="554182"/>
+          </a:xfrm>
+          <a:prstGeom prst="downArrow">
+            <a:avLst/>
+          </a:prstGeom>
+          <a:noFill/>
+          <a:ln w="38100">
+            <a:solidFill>
+              <a:schemeClr val="tx1"/>
+            </a:solidFill>
+          </a:ln>
+        </p:spPr>
+        <p:style>
+          <a:lnRef idx="2">
+            <a:schemeClr val="accent1">
+              <a:shade val="50000"/>
+            </a:schemeClr>
+          </a:lnRef>
+          <a:fillRef idx="1">
+            <a:schemeClr val="accent1"/>
+          </a:fillRef>
+          <a:effectRef idx="0">
+            <a:schemeClr val="accent1"/>
+          </a:effectRef>
+          <a:fontRef idx="minor">
+            <a:schemeClr val="lt1"/>
+          </a:fontRef>
+        </p:style>
+        <p:txBody>
+          <a:bodyPr rtlCol="0" anchor="ctr"/>
+          <a:lstStyle/>
+          <a:p>
+            <a:pPr algn="ctr"/>
+            <a:endParaRPr lang="en-SG"/>
+          </a:p>
+        </p:txBody>
+      </p:sp>
+      <p:sp>
+        <p:nvSpPr>
+          <p:cNvPr id="9" name="TextBox 8">
+            <a:extLst>
+              <a:ext uri="{FF2B5EF4-FFF2-40B4-BE49-F238E27FC236}">
+                <a16:creationId xmlns:a16="http://schemas.microsoft.com/office/drawing/2014/main" id="{E5951C4D-2615-492C-8B4C-6400FC79A33D}"/>
+              </a:ext>
+            </a:extLst>
+          </p:cNvPr>
+          <p:cNvSpPr txBox="1"/>
+          <p:nvPr/>
+        </p:nvSpPr>
+        <p:spPr>
+          <a:xfrm>
+            <a:off x="7164200" y="-960460"/>
+            <a:ext cx="1249381" cy="369332"/>
+          </a:xfrm>
+          <a:prstGeom prst="rect">
+            <a:avLst/>
+          </a:prstGeom>
+          <a:noFill/>
+        </p:spPr>
+        <p:txBody>
+          <a:bodyPr wrap="none" rtlCol="0">
+            <a:spAutoFit/>
+          </a:bodyPr>
+          <a:lstStyle/>
+          <a:p>
+            <a:pPr algn="ctr"/>
+            <a:r>
+              <a:rPr lang="en-SG" b="1" dirty="0"/>
+              <a:t>Code Panel</a:t>
+            </a:r>
+          </a:p>
+        </p:txBody>
+      </p:sp>
+      <p:sp>
+        <p:nvSpPr>
+          <p:cNvPr id="10" name="Arrow: Down 9">
+            <a:extLst>
+              <a:ext uri="{FF2B5EF4-FFF2-40B4-BE49-F238E27FC236}">
+                <a16:creationId xmlns:a16="http://schemas.microsoft.com/office/drawing/2014/main" id="{4B5FA1E7-2641-418D-9855-87AEAC7ED7B2}"/>
+              </a:ext>
+            </a:extLst>
+          </p:cNvPr>
+          <p:cNvSpPr/>
+          <p:nvPr/>
+        </p:nvSpPr>
+        <p:spPr>
+          <a:xfrm rot="5400000">
+            <a:off x="1699108" y="4089954"/>
+            <a:ext cx="517237" cy="554182"/>
+          </a:xfrm>
+          <a:prstGeom prst="downArrow">
+            <a:avLst/>
+          </a:prstGeom>
+          <a:noFill/>
+          <a:ln w="38100">
+            <a:solidFill>
+              <a:schemeClr val="tx1"/>
+            </a:solidFill>
+          </a:ln>
+        </p:spPr>
+        <p:style>
+          <a:lnRef idx="2">
+            <a:schemeClr val="accent1">
+              <a:shade val="50000"/>
+            </a:schemeClr>
+          </a:lnRef>
+          <a:fillRef idx="1">
+            <a:schemeClr val="accent1"/>
+          </a:fillRef>
+          <a:effectRef idx="0">
+            <a:schemeClr val="accent1"/>
+          </a:effectRef>
+          <a:fontRef idx="minor">
+            <a:schemeClr val="lt1"/>
+          </a:fontRef>
+        </p:style>
+        <p:txBody>
+          <a:bodyPr rtlCol="0" anchor="ctr"/>
+          <a:lstStyle/>
+          <a:p>
+            <a:pPr algn="ctr"/>
+            <a:endParaRPr lang="en-SG"/>
+          </a:p>
+        </p:txBody>
+      </p:sp>
+      <p:sp>
+        <p:nvSpPr>
+          <p:cNvPr id="11" name="TextBox 10">
+            <a:extLst>
+              <a:ext uri="{FF2B5EF4-FFF2-40B4-BE49-F238E27FC236}">
+                <a16:creationId xmlns:a16="http://schemas.microsoft.com/office/drawing/2014/main" id="{A0C18F20-A329-4A19-9568-DDF540B86597}"/>
+              </a:ext>
+            </a:extLst>
+          </p:cNvPr>
+          <p:cNvSpPr txBox="1"/>
+          <p:nvPr/>
+        </p:nvSpPr>
+        <p:spPr>
+          <a:xfrm>
+            <a:off x="2234818" y="4182379"/>
+            <a:ext cx="1777538" cy="369332"/>
+          </a:xfrm>
+          <a:prstGeom prst="rect">
+            <a:avLst/>
+          </a:prstGeom>
+          <a:noFill/>
+        </p:spPr>
+        <p:txBody>
+          <a:bodyPr wrap="none" rtlCol="0">
+            <a:spAutoFit/>
+          </a:bodyPr>
+          <a:lstStyle/>
+          <a:p>
+            <a:pPr algn="ctr"/>
+            <a:r>
+              <a:rPr lang="en-SG" b="1" dirty="0"/>
+              <a:t>Contribution Bar</a:t>
+            </a:r>
+          </a:p>
+        </p:txBody>
+      </p:sp>
+      <p:sp>
+        <p:nvSpPr>
+          <p:cNvPr id="13" name="Arrow: Down 12">
+            <a:extLst>
+              <a:ext uri="{FF2B5EF4-FFF2-40B4-BE49-F238E27FC236}">
+                <a16:creationId xmlns:a16="http://schemas.microsoft.com/office/drawing/2014/main" id="{513B7AA3-D8C6-4818-8677-73EFEDACCEF6}"/>
+              </a:ext>
+            </a:extLst>
+          </p:cNvPr>
+          <p:cNvSpPr/>
+          <p:nvPr/>
+        </p:nvSpPr>
+        <p:spPr>
+          <a:xfrm rot="10800000">
+            <a:off x="4012356" y="3000061"/>
+            <a:ext cx="517237" cy="554182"/>
+          </a:xfrm>
+          <a:prstGeom prst="downArrow">
+            <a:avLst/>
+          </a:prstGeom>
+          <a:noFill/>
+          <a:ln w="38100">
+            <a:solidFill>
+              <a:schemeClr val="tx1"/>
+            </a:solidFill>
+          </a:ln>
+        </p:spPr>
+        <p:style>
+          <a:lnRef idx="2">
+            <a:schemeClr val="accent1">
+              <a:shade val="50000"/>
+            </a:schemeClr>
+          </a:lnRef>
+          <a:fillRef idx="1">
+            <a:schemeClr val="accent1"/>
+          </a:fillRef>
+          <a:effectRef idx="0">
+            <a:schemeClr val="accent1"/>
+          </a:effectRef>
+          <a:fontRef idx="minor">
+            <a:schemeClr val="lt1"/>
+          </a:fontRef>
+        </p:style>
+        <p:txBody>
+          <a:bodyPr rtlCol="0" anchor="ctr"/>
+          <a:lstStyle/>
+          <a:p>
+            <a:pPr algn="ctr"/>
+            <a:endParaRPr lang="en-SG"/>
+          </a:p>
+        </p:txBody>
+      </p:sp>
+      <p:sp>
+        <p:nvSpPr>
+          <p:cNvPr id="14" name="TextBox 13">
+            <a:extLst>
+              <a:ext uri="{FF2B5EF4-FFF2-40B4-BE49-F238E27FC236}">
+                <a16:creationId xmlns:a16="http://schemas.microsoft.com/office/drawing/2014/main" id="{61C6FB55-A0EF-4B70-9579-2E3633BAB17C}"/>
+              </a:ext>
+            </a:extLst>
+          </p:cNvPr>
+          <p:cNvSpPr txBox="1"/>
+          <p:nvPr/>
+        </p:nvSpPr>
+        <p:spPr>
+          <a:xfrm>
+            <a:off x="-199157" y="-226763"/>
+            <a:ext cx="900503" cy="369332"/>
+          </a:xfrm>
+          <a:prstGeom prst="rect">
+            <a:avLst/>
+          </a:prstGeom>
+          <a:noFill/>
+        </p:spPr>
+        <p:txBody>
+          <a:bodyPr wrap="none" rtlCol="0">
+            <a:spAutoFit/>
+          </a:bodyPr>
+          <a:lstStyle/>
+          <a:p>
+            <a:pPr algn="ctr"/>
+            <a:r>
+              <a:rPr lang="en-SG" b="1" dirty="0"/>
+              <a:t>Toolbar</a:t>
+            </a:r>
+          </a:p>
+        </p:txBody>
+      </p:sp>
+      <p:sp>
+        <p:nvSpPr>
+          <p:cNvPr id="15" name="Arrow: Down 14">
+            <a:extLst>
+              <a:ext uri="{FF2B5EF4-FFF2-40B4-BE49-F238E27FC236}">
+                <a16:creationId xmlns:a16="http://schemas.microsoft.com/office/drawing/2014/main" id="{C9086935-6371-4258-8020-0D1D97F121AB}"/>
+              </a:ext>
+            </a:extLst>
+          </p:cNvPr>
+          <p:cNvSpPr/>
+          <p:nvPr/>
+        </p:nvSpPr>
+        <p:spPr>
+          <a:xfrm rot="16200000">
+            <a:off x="-7523" y="124097"/>
+            <a:ext cx="517237" cy="554182"/>
+          </a:xfrm>
+          <a:prstGeom prst="downArrow">
+            <a:avLst/>
+          </a:prstGeom>
+          <a:noFill/>
+          <a:ln w="38100">
+            <a:solidFill>
+              <a:schemeClr val="tx1"/>
+            </a:solidFill>
+          </a:ln>
+        </p:spPr>
+        <p:style>
+          <a:lnRef idx="2">
+            <a:schemeClr val="accent1">
+              <a:shade val="50000"/>
+            </a:schemeClr>
+          </a:lnRef>
+          <a:fillRef idx="1">
+            <a:schemeClr val="accent1"/>
+          </a:fillRef>
+          <a:effectRef idx="0">
+            <a:schemeClr val="accent1"/>
+          </a:effectRef>
+          <a:fontRef idx="minor">
+            <a:schemeClr val="lt1"/>
+          </a:fontRef>
+        </p:style>
+        <p:txBody>
+          <a:bodyPr rtlCol="0" anchor="ctr"/>
+          <a:lstStyle/>
+          <a:p>
+            <a:pPr algn="ctr"/>
+            <a:endParaRPr lang="en-SG"/>
+          </a:p>
+        </p:txBody>
+      </p:sp>
+      <p:sp>
+        <p:nvSpPr>
+          <p:cNvPr id="12" name="Arrow: Down 11">
+            <a:extLst>
+              <a:ext uri="{FF2B5EF4-FFF2-40B4-BE49-F238E27FC236}">
+                <a16:creationId xmlns:a16="http://schemas.microsoft.com/office/drawing/2014/main" id="{6E5DA74A-713D-4962-8BB0-EB6D058497FA}"/>
+              </a:ext>
+            </a:extLst>
+          </p:cNvPr>
+          <p:cNvSpPr/>
+          <p:nvPr/>
+        </p:nvSpPr>
+        <p:spPr>
+          <a:xfrm>
+            <a:off x="2561512" y="-601935"/>
+            <a:ext cx="517237" cy="554182"/>
+          </a:xfrm>
+          <a:prstGeom prst="downArrow">
+            <a:avLst/>
+          </a:prstGeom>
+          <a:noFill/>
+          <a:ln w="38100">
+            <a:solidFill>
+              <a:schemeClr val="tx1"/>
+            </a:solidFill>
+          </a:ln>
+        </p:spPr>
+        <p:style>
+          <a:lnRef idx="2">
+            <a:schemeClr val="accent1">
+              <a:shade val="50000"/>
+            </a:schemeClr>
+          </a:lnRef>
+          <a:fillRef idx="1">
+            <a:schemeClr val="accent1"/>
+          </a:fillRef>
+          <a:effectRef idx="0">
+            <a:schemeClr val="accent1"/>
+          </a:effectRef>
+          <a:fontRef idx="minor">
+            <a:schemeClr val="lt1"/>
+          </a:fontRef>
+        </p:style>
+        <p:txBody>
+          <a:bodyPr rtlCol="0" anchor="ctr"/>
+          <a:lstStyle/>
+          <a:p>
+            <a:pPr algn="ctr"/>
+            <a:endParaRPr lang="en-SG"/>
+          </a:p>
+        </p:txBody>
+      </p:sp>
+      <p:sp>
+        <p:nvSpPr>
+          <p:cNvPr id="17" name="TextBox 16">
+            <a:extLst>
+              <a:ext uri="{FF2B5EF4-FFF2-40B4-BE49-F238E27FC236}">
+                <a16:creationId xmlns:a16="http://schemas.microsoft.com/office/drawing/2014/main" id="{6ADBC469-4AA9-4B94-927B-3BC4FF0DB4CD}"/>
+              </a:ext>
+            </a:extLst>
+          </p:cNvPr>
+          <p:cNvSpPr txBox="1"/>
+          <p:nvPr/>
+        </p:nvSpPr>
+        <p:spPr>
+          <a:xfrm>
+            <a:off x="2177009" y="-971267"/>
+            <a:ext cx="1286250" cy="369332"/>
+          </a:xfrm>
+          <a:prstGeom prst="rect">
+            <a:avLst/>
+          </a:prstGeom>
+          <a:noFill/>
+        </p:spPr>
+        <p:txBody>
+          <a:bodyPr wrap="none" rtlCol="0">
+            <a:spAutoFit/>
+          </a:bodyPr>
+          <a:lstStyle/>
+          <a:p>
+            <a:pPr algn="ctr"/>
+            <a:r>
+              <a:rPr lang="en-SG" b="1" dirty="0"/>
+              <a:t>Chart Panel</a:t>
+            </a:r>
+          </a:p>
+        </p:txBody>
+      </p:sp>
+      <p:sp>
+        <p:nvSpPr>
+          <p:cNvPr id="16" name="TextBox 15">
+            <a:extLst>
+              <a:ext uri="{FF2B5EF4-FFF2-40B4-BE49-F238E27FC236}">
+                <a16:creationId xmlns:a16="http://schemas.microsoft.com/office/drawing/2014/main" id="{90DD3F11-A181-4D6B-B39E-4679AA9A63BD}"/>
+              </a:ext>
+            </a:extLst>
+          </p:cNvPr>
+          <p:cNvSpPr txBox="1"/>
+          <p:nvPr/>
+        </p:nvSpPr>
+        <p:spPr>
+          <a:xfrm>
+            <a:off x="-1313181" y="1899377"/>
+            <a:ext cx="1313181" cy="369332"/>
+          </a:xfrm>
+          <a:prstGeom prst="rect">
+            <a:avLst/>
+          </a:prstGeom>
+          <a:noFill/>
+        </p:spPr>
+        <p:txBody>
+          <a:bodyPr wrap="square" rtlCol="0">
+            <a:spAutoFit/>
+          </a:bodyPr>
+          <a:lstStyle/>
+          <a:p>
+            <a:pPr algn="ctr"/>
+            <a:r>
+              <a:rPr lang="en-SG" b="1" dirty="0"/>
+              <a:t>Ramp Chart</a:t>
+            </a:r>
+          </a:p>
+        </p:txBody>
+      </p:sp>
+      <p:sp>
+        <p:nvSpPr>
+          <p:cNvPr id="18" name="Arrow: Down 17">
+            <a:extLst>
+              <a:ext uri="{FF2B5EF4-FFF2-40B4-BE49-F238E27FC236}">
+                <a16:creationId xmlns:a16="http://schemas.microsoft.com/office/drawing/2014/main" id="{0D427F96-5B4B-48FA-B69F-000E5460CBF1}"/>
+              </a:ext>
+            </a:extLst>
+          </p:cNvPr>
+          <p:cNvSpPr/>
+          <p:nvPr/>
+        </p:nvSpPr>
+        <p:spPr>
+          <a:xfrm rot="16200000">
+            <a:off x="18473" y="1806952"/>
+            <a:ext cx="517237" cy="554182"/>
+          </a:xfrm>
+          <a:prstGeom prst="downArrow">
+            <a:avLst/>
+          </a:prstGeom>
+          <a:noFill/>
+          <a:ln w="38100">
+            <a:solidFill>
+              <a:schemeClr val="tx1"/>
+            </a:solidFill>
+          </a:ln>
+        </p:spPr>
+        <p:style>
+          <a:lnRef idx="2">
+            <a:schemeClr val="accent1">
+              <a:shade val="50000"/>
+            </a:schemeClr>
+          </a:lnRef>
+          <a:fillRef idx="1">
+            <a:schemeClr val="accent1"/>
+          </a:fillRef>
+          <a:effectRef idx="0">
+            <a:schemeClr val="accent1"/>
+          </a:effectRef>
+          <a:fontRef idx="minor">
+            <a:schemeClr val="lt1"/>
+          </a:fontRef>
+        </p:style>
+        <p:txBody>
+          <a:bodyPr rtlCol="0" anchor="ctr"/>
+          <a:lstStyle/>
+          <a:p>
+            <a:pPr algn="ctr"/>
+            <a:endParaRPr lang="en-SG"/>
+          </a:p>
+        </p:txBody>
+      </p:sp>
     </p:spTree>
     <p:extLst>
       <p:ext uri="{BB962C8B-B14F-4D97-AF65-F5344CB8AC3E}">

</xml_diff>

<commit_message>
Edit diagram in UG
</commit_message>
<xml_diff>
--- a/docs/diagrams/ug-report.pptx
+++ b/docs/diagrams/ug-report.pptx
@@ -261,7 +261,7 @@
           <a:p>
             <a:fld id="{D5F4EE06-143D-4C2F-8831-1CDA21FFE47B}" type="datetimeFigureOut">
               <a:rPr lang="en-SG" smtClean="0"/>
-              <a:t>20/12/2018</a:t>
+              <a:t>23/1/2019</a:t>
             </a:fld>
             <a:endParaRPr lang="en-SG"/>
           </a:p>
@@ -461,7 +461,7 @@
           <a:p>
             <a:fld id="{D5F4EE06-143D-4C2F-8831-1CDA21FFE47B}" type="datetimeFigureOut">
               <a:rPr lang="en-SG" smtClean="0"/>
-              <a:t>20/12/2018</a:t>
+              <a:t>23/1/2019</a:t>
             </a:fld>
             <a:endParaRPr lang="en-SG"/>
           </a:p>
@@ -671,7 +671,7 @@
           <a:p>
             <a:fld id="{D5F4EE06-143D-4C2F-8831-1CDA21FFE47B}" type="datetimeFigureOut">
               <a:rPr lang="en-SG" smtClean="0"/>
-              <a:t>20/12/2018</a:t>
+              <a:t>23/1/2019</a:t>
             </a:fld>
             <a:endParaRPr lang="en-SG"/>
           </a:p>
@@ -871,7 +871,7 @@
           <a:p>
             <a:fld id="{D5F4EE06-143D-4C2F-8831-1CDA21FFE47B}" type="datetimeFigureOut">
               <a:rPr lang="en-SG" smtClean="0"/>
-              <a:t>20/12/2018</a:t>
+              <a:t>23/1/2019</a:t>
             </a:fld>
             <a:endParaRPr lang="en-SG"/>
           </a:p>
@@ -1147,7 +1147,7 @@
           <a:p>
             <a:fld id="{D5F4EE06-143D-4C2F-8831-1CDA21FFE47B}" type="datetimeFigureOut">
               <a:rPr lang="en-SG" smtClean="0"/>
-              <a:t>20/12/2018</a:t>
+              <a:t>23/1/2019</a:t>
             </a:fld>
             <a:endParaRPr lang="en-SG"/>
           </a:p>
@@ -1415,7 +1415,7 @@
           <a:p>
             <a:fld id="{D5F4EE06-143D-4C2F-8831-1CDA21FFE47B}" type="datetimeFigureOut">
               <a:rPr lang="en-SG" smtClean="0"/>
-              <a:t>20/12/2018</a:t>
+              <a:t>23/1/2019</a:t>
             </a:fld>
             <a:endParaRPr lang="en-SG"/>
           </a:p>
@@ -1830,7 +1830,7 @@
           <a:p>
             <a:fld id="{D5F4EE06-143D-4C2F-8831-1CDA21FFE47B}" type="datetimeFigureOut">
               <a:rPr lang="en-SG" smtClean="0"/>
-              <a:t>20/12/2018</a:t>
+              <a:t>23/1/2019</a:t>
             </a:fld>
             <a:endParaRPr lang="en-SG"/>
           </a:p>
@@ -1972,7 +1972,7 @@
           <a:p>
             <a:fld id="{D5F4EE06-143D-4C2F-8831-1CDA21FFE47B}" type="datetimeFigureOut">
               <a:rPr lang="en-SG" smtClean="0"/>
-              <a:t>20/12/2018</a:t>
+              <a:t>23/1/2019</a:t>
             </a:fld>
             <a:endParaRPr lang="en-SG"/>
           </a:p>
@@ -2085,7 +2085,7 @@
           <a:p>
             <a:fld id="{D5F4EE06-143D-4C2F-8831-1CDA21FFE47B}" type="datetimeFigureOut">
               <a:rPr lang="en-SG" smtClean="0"/>
-              <a:t>20/12/2018</a:t>
+              <a:t>23/1/2019</a:t>
             </a:fld>
             <a:endParaRPr lang="en-SG"/>
           </a:p>
@@ -2398,7 +2398,7 @@
           <a:p>
             <a:fld id="{D5F4EE06-143D-4C2F-8831-1CDA21FFE47B}" type="datetimeFigureOut">
               <a:rPr lang="en-SG" smtClean="0"/>
-              <a:t>20/12/2018</a:t>
+              <a:t>23/1/2019</a:t>
             </a:fld>
             <a:endParaRPr lang="en-SG"/>
           </a:p>
@@ -2687,7 +2687,7 @@
           <a:p>
             <a:fld id="{D5F4EE06-143D-4C2F-8831-1CDA21FFE47B}" type="datetimeFigureOut">
               <a:rPr lang="en-SG" smtClean="0"/>
-              <a:t>20/12/2018</a:t>
+              <a:t>23/1/2019</a:t>
             </a:fld>
             <a:endParaRPr lang="en-SG"/>
           </a:p>
@@ -2930,7 +2930,7 @@
           <a:p>
             <a:fld id="{D5F4EE06-143D-4C2F-8831-1CDA21FFE47B}" type="datetimeFigureOut">
               <a:rPr lang="en-SG" smtClean="0"/>
-              <a:t>20/12/2018</a:t>
+              <a:t>23/1/2019</a:t>
             </a:fld>
             <a:endParaRPr lang="en-SG"/>
           </a:p>
@@ -3349,10 +3349,10 @@
       </p:grpSpPr>
       <p:pic>
         <p:nvPicPr>
-          <p:cNvPr id="4" name="图片 3">
-            <a:extLst>
-              <a:ext uri="{FF2B5EF4-FFF2-40B4-BE49-F238E27FC236}">
-                <a16:creationId xmlns:a16="http://schemas.microsoft.com/office/drawing/2014/main" id="{790658E2-4B72-4B10-AE63-A77734D25760}"/>
+          <p:cNvPr id="3" name="图片 2">
+            <a:extLst>
+              <a:ext uri="{FF2B5EF4-FFF2-40B4-BE49-F238E27FC236}">
+                <a16:creationId xmlns:a16="http://schemas.microsoft.com/office/drawing/2014/main" id="{078C2DC3-05AE-4DBC-A6D6-2BF0D2EFA39D}"/>
               </a:ext>
             </a:extLst>
           </p:cNvPr>
@@ -3375,8 +3375,8 @@
         </p:blipFill>
         <p:spPr>
           <a:xfrm>
-            <a:off x="548207" y="0"/>
-            <a:ext cx="9728068" cy="5302028"/>
+            <a:off x="528187" y="-2040"/>
+            <a:ext cx="9534617" cy="4689403"/>
           </a:xfrm>
           <a:prstGeom prst="rect">
             <a:avLst/>
@@ -3397,7 +3397,7 @@
         </p:nvSpPr>
         <p:spPr>
           <a:xfrm>
-            <a:off x="3901320" y="3554244"/>
+            <a:off x="4532800" y="1714711"/>
             <a:ext cx="739306" cy="369332"/>
           </a:xfrm>
           <a:prstGeom prst="rect">
@@ -3521,7 +3521,7 @@
         </p:nvSpPr>
         <p:spPr>
           <a:xfrm rot="5400000">
-            <a:off x="1699108" y="4089954"/>
+            <a:off x="1699109" y="3673304"/>
             <a:ext cx="517237" cy="554182"/>
           </a:xfrm>
           <a:prstGeom prst="downArrow">
@@ -3573,7 +3573,7 @@
         </p:nvSpPr>
         <p:spPr>
           <a:xfrm>
-            <a:off x="2234818" y="4182379"/>
+            <a:off x="2271366" y="3766376"/>
             <a:ext cx="1777538" cy="369332"/>
           </a:xfrm>
           <a:prstGeom prst="rect">
@@ -3609,7 +3609,7 @@
         </p:nvSpPr>
         <p:spPr>
           <a:xfrm rot="10800000">
-            <a:off x="4012356" y="3000061"/>
+            <a:off x="4643835" y="1179832"/>
             <a:ext cx="517237" cy="554182"/>
           </a:xfrm>
           <a:prstGeom prst="downArrow">
@@ -3661,7 +3661,7 @@
         </p:nvSpPr>
         <p:spPr>
           <a:xfrm>
-            <a:off x="-199157" y="-226763"/>
+            <a:off x="-926499" y="181582"/>
             <a:ext cx="900503" cy="369332"/>
           </a:xfrm>
           <a:prstGeom prst="rect">
@@ -3837,7 +3837,7 @@
         </p:nvSpPr>
         <p:spPr>
           <a:xfrm>
-            <a:off x="-1313181" y="1899377"/>
+            <a:off x="-1277669" y="1824977"/>
             <a:ext cx="1313181" cy="369332"/>
           </a:xfrm>
           <a:prstGeom prst="rect">
@@ -3873,7 +3873,7 @@
         </p:nvSpPr>
         <p:spPr>
           <a:xfrm rot="16200000">
-            <a:off x="18473" y="1806952"/>
+            <a:off x="53985" y="1744806"/>
             <a:ext cx="517237" cy="554182"/>
           </a:xfrm>
           <a:prstGeom prst="downArrow">
@@ -3908,6 +3908,273 @@
           <a:p>
             <a:pPr algn="ctr"/>
             <a:endParaRPr lang="en-SG"/>
+          </a:p>
+        </p:txBody>
+      </p:sp>
+      <p:sp>
+        <p:nvSpPr>
+          <p:cNvPr id="19" name="Arrow: Down 7">
+            <a:extLst>
+              <a:ext uri="{FF2B5EF4-FFF2-40B4-BE49-F238E27FC236}">
+                <a16:creationId xmlns:a16="http://schemas.microsoft.com/office/drawing/2014/main" id="{1CDA47B4-2B98-4CCB-8CBD-4C13A7A21328}"/>
+              </a:ext>
+            </a:extLst>
+          </p:cNvPr>
+          <p:cNvSpPr/>
+          <p:nvPr/>
+        </p:nvSpPr>
+        <p:spPr>
+          <a:xfrm>
+            <a:off x="9058710" y="181582"/>
+            <a:ext cx="165190" cy="618288"/>
+          </a:xfrm>
+          <a:prstGeom prst="downArrow">
+            <a:avLst/>
+          </a:prstGeom>
+          <a:noFill/>
+          <a:ln w="38100">
+            <a:solidFill>
+              <a:schemeClr val="tx1"/>
+            </a:solidFill>
+          </a:ln>
+        </p:spPr>
+        <p:style>
+          <a:lnRef idx="2">
+            <a:schemeClr val="accent1">
+              <a:shade val="50000"/>
+            </a:schemeClr>
+          </a:lnRef>
+          <a:fillRef idx="1">
+            <a:schemeClr val="accent1"/>
+          </a:fillRef>
+          <a:effectRef idx="0">
+            <a:schemeClr val="accent1"/>
+          </a:effectRef>
+          <a:fontRef idx="minor">
+            <a:schemeClr val="lt1"/>
+          </a:fontRef>
+        </p:style>
+        <p:txBody>
+          <a:bodyPr rtlCol="0" anchor="ctr"/>
+          <a:lstStyle/>
+          <a:p>
+            <a:pPr algn="ctr"/>
+            <a:endParaRPr lang="en-SG"/>
+          </a:p>
+        </p:txBody>
+      </p:sp>
+      <p:sp>
+        <p:nvSpPr>
+          <p:cNvPr id="20" name="TextBox 8">
+            <a:extLst>
+              <a:ext uri="{FF2B5EF4-FFF2-40B4-BE49-F238E27FC236}">
+                <a16:creationId xmlns:a16="http://schemas.microsoft.com/office/drawing/2014/main" id="{EDFB4028-A919-4731-8A93-2372D7A78B91}"/>
+              </a:ext>
+            </a:extLst>
+          </p:cNvPr>
+          <p:cNvSpPr txBox="1"/>
+          <p:nvPr/>
+        </p:nvSpPr>
+        <p:spPr>
+          <a:xfrm>
+            <a:off x="8432622" y="-279561"/>
+            <a:ext cx="1399614" cy="369332"/>
+          </a:xfrm>
+          <a:prstGeom prst="rect">
+            <a:avLst/>
+          </a:prstGeom>
+          <a:noFill/>
+        </p:spPr>
+        <p:txBody>
+          <a:bodyPr wrap="none" rtlCol="0">
+            <a:spAutoFit/>
+          </a:bodyPr>
+          <a:lstStyle/>
+          <a:p>
+            <a:pPr algn="ctr"/>
+            <a:r>
+              <a:rPr lang="en-US" altLang="zh-CN" b="1" dirty="0"/>
+              <a:t>History View</a:t>
+            </a:r>
+            <a:endParaRPr lang="en-SG" b="1" dirty="0"/>
+          </a:p>
+        </p:txBody>
+      </p:sp>
+      <p:sp>
+        <p:nvSpPr>
+          <p:cNvPr id="21" name="Arrow: Down 7">
+            <a:extLst>
+              <a:ext uri="{FF2B5EF4-FFF2-40B4-BE49-F238E27FC236}">
+                <a16:creationId xmlns:a16="http://schemas.microsoft.com/office/drawing/2014/main" id="{A9E91D31-EF4A-4D56-8FB2-1C24639FA1F0}"/>
+              </a:ext>
+            </a:extLst>
+          </p:cNvPr>
+          <p:cNvSpPr/>
+          <p:nvPr/>
+        </p:nvSpPr>
+        <p:spPr>
+          <a:xfrm rot="5400000">
+            <a:off x="9674863" y="579726"/>
+            <a:ext cx="141163" cy="634719"/>
+          </a:xfrm>
+          <a:prstGeom prst="downArrow">
+            <a:avLst/>
+          </a:prstGeom>
+          <a:noFill/>
+          <a:ln w="38100">
+            <a:solidFill>
+              <a:schemeClr val="tx1"/>
+            </a:solidFill>
+          </a:ln>
+        </p:spPr>
+        <p:style>
+          <a:lnRef idx="2">
+            <a:schemeClr val="accent1">
+              <a:shade val="50000"/>
+            </a:schemeClr>
+          </a:lnRef>
+          <a:fillRef idx="1">
+            <a:schemeClr val="accent1"/>
+          </a:fillRef>
+          <a:effectRef idx="0">
+            <a:schemeClr val="accent1"/>
+          </a:effectRef>
+          <a:fontRef idx="minor">
+            <a:schemeClr val="lt1"/>
+          </a:fontRef>
+        </p:style>
+        <p:txBody>
+          <a:bodyPr rtlCol="0" anchor="ctr"/>
+          <a:lstStyle/>
+          <a:p>
+            <a:pPr algn="ctr"/>
+            <a:endParaRPr lang="en-SG"/>
+          </a:p>
+        </p:txBody>
+      </p:sp>
+      <p:sp>
+        <p:nvSpPr>
+          <p:cNvPr id="22" name="TextBox 8">
+            <a:extLst>
+              <a:ext uri="{FF2B5EF4-FFF2-40B4-BE49-F238E27FC236}">
+                <a16:creationId xmlns:a16="http://schemas.microsoft.com/office/drawing/2014/main" id="{BDE09DB7-39ED-4C2F-AD1C-1E6E013DC6A3}"/>
+              </a:ext>
+            </a:extLst>
+          </p:cNvPr>
+          <p:cNvSpPr txBox="1"/>
+          <p:nvPr/>
+        </p:nvSpPr>
+        <p:spPr>
+          <a:xfrm>
+            <a:off x="9225331" y="457172"/>
+            <a:ext cx="1318438" cy="369332"/>
+          </a:xfrm>
+          <a:prstGeom prst="rect">
+            <a:avLst/>
+          </a:prstGeom>
+          <a:noFill/>
+        </p:spPr>
+        <p:txBody>
+          <a:bodyPr wrap="none" rtlCol="0">
+            <a:spAutoFit/>
+          </a:bodyPr>
+          <a:lstStyle/>
+          <a:p>
+            <a:pPr algn="ctr"/>
+            <a:r>
+              <a:rPr lang="en-US" altLang="zh-CN" b="1" dirty="0"/>
+              <a:t>Blame View</a:t>
+            </a:r>
+            <a:endParaRPr lang="en-SG" b="1" dirty="0"/>
+          </a:p>
+        </p:txBody>
+      </p:sp>
+      <p:sp>
+        <p:nvSpPr>
+          <p:cNvPr id="23" name="Arrow: Down 7">
+            <a:extLst>
+              <a:ext uri="{FF2B5EF4-FFF2-40B4-BE49-F238E27FC236}">
+                <a16:creationId xmlns:a16="http://schemas.microsoft.com/office/drawing/2014/main" id="{8EB59AEB-EADC-403C-9DCF-C7B8A68FC5E6}"/>
+              </a:ext>
+            </a:extLst>
+          </p:cNvPr>
+          <p:cNvSpPr/>
+          <p:nvPr/>
+        </p:nvSpPr>
+        <p:spPr>
+          <a:xfrm rot="5400000">
+            <a:off x="1727904" y="527722"/>
+            <a:ext cx="141163" cy="634719"/>
+          </a:xfrm>
+          <a:prstGeom prst="downArrow">
+            <a:avLst/>
+          </a:prstGeom>
+          <a:noFill/>
+          <a:ln w="38100">
+            <a:solidFill>
+              <a:schemeClr val="tx1"/>
+            </a:solidFill>
+          </a:ln>
+        </p:spPr>
+        <p:style>
+          <a:lnRef idx="2">
+            <a:schemeClr val="accent1">
+              <a:shade val="50000"/>
+            </a:schemeClr>
+          </a:lnRef>
+          <a:fillRef idx="1">
+            <a:schemeClr val="accent1"/>
+          </a:fillRef>
+          <a:effectRef idx="0">
+            <a:schemeClr val="accent1"/>
+          </a:effectRef>
+          <a:fontRef idx="minor">
+            <a:schemeClr val="lt1"/>
+          </a:fontRef>
+        </p:style>
+        <p:txBody>
+          <a:bodyPr rtlCol="0" anchor="ctr"/>
+          <a:lstStyle/>
+          <a:p>
+            <a:pPr algn="ctr"/>
+            <a:endParaRPr lang="en-SG"/>
+          </a:p>
+        </p:txBody>
+      </p:sp>
+      <p:sp>
+        <p:nvSpPr>
+          <p:cNvPr id="24" name="TextBox 8">
+            <a:extLst>
+              <a:ext uri="{FF2B5EF4-FFF2-40B4-BE49-F238E27FC236}">
+                <a16:creationId xmlns:a16="http://schemas.microsoft.com/office/drawing/2014/main" id="{20990FD0-5350-4F70-B284-CF2ED3D2AB96}"/>
+              </a:ext>
+            </a:extLst>
+          </p:cNvPr>
+          <p:cNvSpPr txBox="1"/>
+          <p:nvPr/>
+        </p:nvSpPr>
+        <p:spPr>
+          <a:xfrm>
+            <a:off x="2118606" y="659807"/>
+            <a:ext cx="1114216" cy="369332"/>
+          </a:xfrm>
+          <a:prstGeom prst="rect">
+            <a:avLst/>
+          </a:prstGeom>
+          <a:noFill/>
+        </p:spPr>
+        <p:txBody>
+          <a:bodyPr wrap="none" rtlCol="0">
+            <a:spAutoFit/>
+          </a:bodyPr>
+          <a:lstStyle/>
+          <a:p>
+            <a:pPr algn="ctr"/>
+            <a:r>
+              <a:rPr lang="en-US" altLang="zh-CN" b="1" dirty="0"/>
+              <a:t>Repo Link</a:t>
+            </a:r>
+            <a:endParaRPr lang="en-SG" b="1" dirty="0"/>
           </a:p>
         </p:txBody>
       </p:sp>

</xml_diff>

<commit_message>
[#466] CodeView: give link to history and blame views of each file (#490)
Reviewers may have the need to investigate on a file to see who else
has edited the same file, however, this feature is not available in the
code view.

Let's add direct links in the code view to visit the history view and
blame view of the files (on GitHub).
</commit_message>
<xml_diff>
--- a/docs/diagrams/ug-report.pptx
+++ b/docs/diagrams/ug-report.pptx
@@ -261,7 +261,7 @@
           <a:p>
             <a:fld id="{D5F4EE06-143D-4C2F-8831-1CDA21FFE47B}" type="datetimeFigureOut">
               <a:rPr lang="en-SG" smtClean="0"/>
-              <a:t>20/12/2018</a:t>
+              <a:t>23/1/2019</a:t>
             </a:fld>
             <a:endParaRPr lang="en-SG"/>
           </a:p>
@@ -461,7 +461,7 @@
           <a:p>
             <a:fld id="{D5F4EE06-143D-4C2F-8831-1CDA21FFE47B}" type="datetimeFigureOut">
               <a:rPr lang="en-SG" smtClean="0"/>
-              <a:t>20/12/2018</a:t>
+              <a:t>23/1/2019</a:t>
             </a:fld>
             <a:endParaRPr lang="en-SG"/>
           </a:p>
@@ -671,7 +671,7 @@
           <a:p>
             <a:fld id="{D5F4EE06-143D-4C2F-8831-1CDA21FFE47B}" type="datetimeFigureOut">
               <a:rPr lang="en-SG" smtClean="0"/>
-              <a:t>20/12/2018</a:t>
+              <a:t>23/1/2019</a:t>
             </a:fld>
             <a:endParaRPr lang="en-SG"/>
           </a:p>
@@ -871,7 +871,7 @@
           <a:p>
             <a:fld id="{D5F4EE06-143D-4C2F-8831-1CDA21FFE47B}" type="datetimeFigureOut">
               <a:rPr lang="en-SG" smtClean="0"/>
-              <a:t>20/12/2018</a:t>
+              <a:t>23/1/2019</a:t>
             </a:fld>
             <a:endParaRPr lang="en-SG"/>
           </a:p>
@@ -1147,7 +1147,7 @@
           <a:p>
             <a:fld id="{D5F4EE06-143D-4C2F-8831-1CDA21FFE47B}" type="datetimeFigureOut">
               <a:rPr lang="en-SG" smtClean="0"/>
-              <a:t>20/12/2018</a:t>
+              <a:t>23/1/2019</a:t>
             </a:fld>
             <a:endParaRPr lang="en-SG"/>
           </a:p>
@@ -1415,7 +1415,7 @@
           <a:p>
             <a:fld id="{D5F4EE06-143D-4C2F-8831-1CDA21FFE47B}" type="datetimeFigureOut">
               <a:rPr lang="en-SG" smtClean="0"/>
-              <a:t>20/12/2018</a:t>
+              <a:t>23/1/2019</a:t>
             </a:fld>
             <a:endParaRPr lang="en-SG"/>
           </a:p>
@@ -1830,7 +1830,7 @@
           <a:p>
             <a:fld id="{D5F4EE06-143D-4C2F-8831-1CDA21FFE47B}" type="datetimeFigureOut">
               <a:rPr lang="en-SG" smtClean="0"/>
-              <a:t>20/12/2018</a:t>
+              <a:t>23/1/2019</a:t>
             </a:fld>
             <a:endParaRPr lang="en-SG"/>
           </a:p>
@@ -1972,7 +1972,7 @@
           <a:p>
             <a:fld id="{D5F4EE06-143D-4C2F-8831-1CDA21FFE47B}" type="datetimeFigureOut">
               <a:rPr lang="en-SG" smtClean="0"/>
-              <a:t>20/12/2018</a:t>
+              <a:t>23/1/2019</a:t>
             </a:fld>
             <a:endParaRPr lang="en-SG"/>
           </a:p>
@@ -2085,7 +2085,7 @@
           <a:p>
             <a:fld id="{D5F4EE06-143D-4C2F-8831-1CDA21FFE47B}" type="datetimeFigureOut">
               <a:rPr lang="en-SG" smtClean="0"/>
-              <a:t>20/12/2018</a:t>
+              <a:t>23/1/2019</a:t>
             </a:fld>
             <a:endParaRPr lang="en-SG"/>
           </a:p>
@@ -2398,7 +2398,7 @@
           <a:p>
             <a:fld id="{D5F4EE06-143D-4C2F-8831-1CDA21FFE47B}" type="datetimeFigureOut">
               <a:rPr lang="en-SG" smtClean="0"/>
-              <a:t>20/12/2018</a:t>
+              <a:t>23/1/2019</a:t>
             </a:fld>
             <a:endParaRPr lang="en-SG"/>
           </a:p>
@@ -2687,7 +2687,7 @@
           <a:p>
             <a:fld id="{D5F4EE06-143D-4C2F-8831-1CDA21FFE47B}" type="datetimeFigureOut">
               <a:rPr lang="en-SG" smtClean="0"/>
-              <a:t>20/12/2018</a:t>
+              <a:t>23/1/2019</a:t>
             </a:fld>
             <a:endParaRPr lang="en-SG"/>
           </a:p>
@@ -2930,7 +2930,7 @@
           <a:p>
             <a:fld id="{D5F4EE06-143D-4C2F-8831-1CDA21FFE47B}" type="datetimeFigureOut">
               <a:rPr lang="en-SG" smtClean="0"/>
-              <a:t>20/12/2018</a:t>
+              <a:t>23/1/2019</a:t>
             </a:fld>
             <a:endParaRPr lang="en-SG"/>
           </a:p>
@@ -3349,10 +3349,10 @@
       </p:grpSpPr>
       <p:pic>
         <p:nvPicPr>
-          <p:cNvPr id="4" name="图片 3">
-            <a:extLst>
-              <a:ext uri="{FF2B5EF4-FFF2-40B4-BE49-F238E27FC236}">
-                <a16:creationId xmlns:a16="http://schemas.microsoft.com/office/drawing/2014/main" id="{790658E2-4B72-4B10-AE63-A77734D25760}"/>
+          <p:cNvPr id="3" name="图片 2">
+            <a:extLst>
+              <a:ext uri="{FF2B5EF4-FFF2-40B4-BE49-F238E27FC236}">
+                <a16:creationId xmlns:a16="http://schemas.microsoft.com/office/drawing/2014/main" id="{078C2DC3-05AE-4DBC-A6D6-2BF0D2EFA39D}"/>
               </a:ext>
             </a:extLst>
           </p:cNvPr>
@@ -3375,8 +3375,8 @@
         </p:blipFill>
         <p:spPr>
           <a:xfrm>
-            <a:off x="548207" y="0"/>
-            <a:ext cx="9728068" cy="5302028"/>
+            <a:off x="528187" y="-2040"/>
+            <a:ext cx="9534617" cy="4689403"/>
           </a:xfrm>
           <a:prstGeom prst="rect">
             <a:avLst/>
@@ -3397,7 +3397,7 @@
         </p:nvSpPr>
         <p:spPr>
           <a:xfrm>
-            <a:off x="3901320" y="3554244"/>
+            <a:off x="4532800" y="1714711"/>
             <a:ext cx="739306" cy="369332"/>
           </a:xfrm>
           <a:prstGeom prst="rect">
@@ -3521,7 +3521,7 @@
         </p:nvSpPr>
         <p:spPr>
           <a:xfrm rot="5400000">
-            <a:off x="1699108" y="4089954"/>
+            <a:off x="1699109" y="3673304"/>
             <a:ext cx="517237" cy="554182"/>
           </a:xfrm>
           <a:prstGeom prst="downArrow">
@@ -3573,7 +3573,7 @@
         </p:nvSpPr>
         <p:spPr>
           <a:xfrm>
-            <a:off x="2234818" y="4182379"/>
+            <a:off x="2271366" y="3766376"/>
             <a:ext cx="1777538" cy="369332"/>
           </a:xfrm>
           <a:prstGeom prst="rect">
@@ -3609,7 +3609,7 @@
         </p:nvSpPr>
         <p:spPr>
           <a:xfrm rot="10800000">
-            <a:off x="4012356" y="3000061"/>
+            <a:off x="4643835" y="1179832"/>
             <a:ext cx="517237" cy="554182"/>
           </a:xfrm>
           <a:prstGeom prst="downArrow">
@@ -3661,7 +3661,7 @@
         </p:nvSpPr>
         <p:spPr>
           <a:xfrm>
-            <a:off x="-199157" y="-226763"/>
+            <a:off x="-926499" y="181582"/>
             <a:ext cx="900503" cy="369332"/>
           </a:xfrm>
           <a:prstGeom prst="rect">
@@ -3837,7 +3837,7 @@
         </p:nvSpPr>
         <p:spPr>
           <a:xfrm>
-            <a:off x="-1313181" y="1899377"/>
+            <a:off x="-1277669" y="1824977"/>
             <a:ext cx="1313181" cy="369332"/>
           </a:xfrm>
           <a:prstGeom prst="rect">
@@ -3873,7 +3873,7 @@
         </p:nvSpPr>
         <p:spPr>
           <a:xfrm rot="16200000">
-            <a:off x="18473" y="1806952"/>
+            <a:off x="53985" y="1744806"/>
             <a:ext cx="517237" cy="554182"/>
           </a:xfrm>
           <a:prstGeom prst="downArrow">
@@ -3908,6 +3908,273 @@
           <a:p>
             <a:pPr algn="ctr"/>
             <a:endParaRPr lang="en-SG"/>
+          </a:p>
+        </p:txBody>
+      </p:sp>
+      <p:sp>
+        <p:nvSpPr>
+          <p:cNvPr id="19" name="Arrow: Down 7">
+            <a:extLst>
+              <a:ext uri="{FF2B5EF4-FFF2-40B4-BE49-F238E27FC236}">
+                <a16:creationId xmlns:a16="http://schemas.microsoft.com/office/drawing/2014/main" id="{1CDA47B4-2B98-4CCB-8CBD-4C13A7A21328}"/>
+              </a:ext>
+            </a:extLst>
+          </p:cNvPr>
+          <p:cNvSpPr/>
+          <p:nvPr/>
+        </p:nvSpPr>
+        <p:spPr>
+          <a:xfrm>
+            <a:off x="9058710" y="181582"/>
+            <a:ext cx="165190" cy="618288"/>
+          </a:xfrm>
+          <a:prstGeom prst="downArrow">
+            <a:avLst/>
+          </a:prstGeom>
+          <a:noFill/>
+          <a:ln w="38100">
+            <a:solidFill>
+              <a:schemeClr val="tx1"/>
+            </a:solidFill>
+          </a:ln>
+        </p:spPr>
+        <p:style>
+          <a:lnRef idx="2">
+            <a:schemeClr val="accent1">
+              <a:shade val="50000"/>
+            </a:schemeClr>
+          </a:lnRef>
+          <a:fillRef idx="1">
+            <a:schemeClr val="accent1"/>
+          </a:fillRef>
+          <a:effectRef idx="0">
+            <a:schemeClr val="accent1"/>
+          </a:effectRef>
+          <a:fontRef idx="minor">
+            <a:schemeClr val="lt1"/>
+          </a:fontRef>
+        </p:style>
+        <p:txBody>
+          <a:bodyPr rtlCol="0" anchor="ctr"/>
+          <a:lstStyle/>
+          <a:p>
+            <a:pPr algn="ctr"/>
+            <a:endParaRPr lang="en-SG"/>
+          </a:p>
+        </p:txBody>
+      </p:sp>
+      <p:sp>
+        <p:nvSpPr>
+          <p:cNvPr id="20" name="TextBox 8">
+            <a:extLst>
+              <a:ext uri="{FF2B5EF4-FFF2-40B4-BE49-F238E27FC236}">
+                <a16:creationId xmlns:a16="http://schemas.microsoft.com/office/drawing/2014/main" id="{EDFB4028-A919-4731-8A93-2372D7A78B91}"/>
+              </a:ext>
+            </a:extLst>
+          </p:cNvPr>
+          <p:cNvSpPr txBox="1"/>
+          <p:nvPr/>
+        </p:nvSpPr>
+        <p:spPr>
+          <a:xfrm>
+            <a:off x="8432622" y="-279561"/>
+            <a:ext cx="1399614" cy="369332"/>
+          </a:xfrm>
+          <a:prstGeom prst="rect">
+            <a:avLst/>
+          </a:prstGeom>
+          <a:noFill/>
+        </p:spPr>
+        <p:txBody>
+          <a:bodyPr wrap="none" rtlCol="0">
+            <a:spAutoFit/>
+          </a:bodyPr>
+          <a:lstStyle/>
+          <a:p>
+            <a:pPr algn="ctr"/>
+            <a:r>
+              <a:rPr lang="en-US" altLang="zh-CN" b="1" dirty="0"/>
+              <a:t>History View</a:t>
+            </a:r>
+            <a:endParaRPr lang="en-SG" b="1" dirty="0"/>
+          </a:p>
+        </p:txBody>
+      </p:sp>
+      <p:sp>
+        <p:nvSpPr>
+          <p:cNvPr id="21" name="Arrow: Down 7">
+            <a:extLst>
+              <a:ext uri="{FF2B5EF4-FFF2-40B4-BE49-F238E27FC236}">
+                <a16:creationId xmlns:a16="http://schemas.microsoft.com/office/drawing/2014/main" id="{A9E91D31-EF4A-4D56-8FB2-1C24639FA1F0}"/>
+              </a:ext>
+            </a:extLst>
+          </p:cNvPr>
+          <p:cNvSpPr/>
+          <p:nvPr/>
+        </p:nvSpPr>
+        <p:spPr>
+          <a:xfrm rot="5400000">
+            <a:off x="9674863" y="579726"/>
+            <a:ext cx="141163" cy="634719"/>
+          </a:xfrm>
+          <a:prstGeom prst="downArrow">
+            <a:avLst/>
+          </a:prstGeom>
+          <a:noFill/>
+          <a:ln w="38100">
+            <a:solidFill>
+              <a:schemeClr val="tx1"/>
+            </a:solidFill>
+          </a:ln>
+        </p:spPr>
+        <p:style>
+          <a:lnRef idx="2">
+            <a:schemeClr val="accent1">
+              <a:shade val="50000"/>
+            </a:schemeClr>
+          </a:lnRef>
+          <a:fillRef idx="1">
+            <a:schemeClr val="accent1"/>
+          </a:fillRef>
+          <a:effectRef idx="0">
+            <a:schemeClr val="accent1"/>
+          </a:effectRef>
+          <a:fontRef idx="minor">
+            <a:schemeClr val="lt1"/>
+          </a:fontRef>
+        </p:style>
+        <p:txBody>
+          <a:bodyPr rtlCol="0" anchor="ctr"/>
+          <a:lstStyle/>
+          <a:p>
+            <a:pPr algn="ctr"/>
+            <a:endParaRPr lang="en-SG"/>
+          </a:p>
+        </p:txBody>
+      </p:sp>
+      <p:sp>
+        <p:nvSpPr>
+          <p:cNvPr id="22" name="TextBox 8">
+            <a:extLst>
+              <a:ext uri="{FF2B5EF4-FFF2-40B4-BE49-F238E27FC236}">
+                <a16:creationId xmlns:a16="http://schemas.microsoft.com/office/drawing/2014/main" id="{BDE09DB7-39ED-4C2F-AD1C-1E6E013DC6A3}"/>
+              </a:ext>
+            </a:extLst>
+          </p:cNvPr>
+          <p:cNvSpPr txBox="1"/>
+          <p:nvPr/>
+        </p:nvSpPr>
+        <p:spPr>
+          <a:xfrm>
+            <a:off x="9225331" y="457172"/>
+            <a:ext cx="1318438" cy="369332"/>
+          </a:xfrm>
+          <a:prstGeom prst="rect">
+            <a:avLst/>
+          </a:prstGeom>
+          <a:noFill/>
+        </p:spPr>
+        <p:txBody>
+          <a:bodyPr wrap="none" rtlCol="0">
+            <a:spAutoFit/>
+          </a:bodyPr>
+          <a:lstStyle/>
+          <a:p>
+            <a:pPr algn="ctr"/>
+            <a:r>
+              <a:rPr lang="en-US" altLang="zh-CN" b="1" dirty="0"/>
+              <a:t>Blame View</a:t>
+            </a:r>
+            <a:endParaRPr lang="en-SG" b="1" dirty="0"/>
+          </a:p>
+        </p:txBody>
+      </p:sp>
+      <p:sp>
+        <p:nvSpPr>
+          <p:cNvPr id="23" name="Arrow: Down 7">
+            <a:extLst>
+              <a:ext uri="{FF2B5EF4-FFF2-40B4-BE49-F238E27FC236}">
+                <a16:creationId xmlns:a16="http://schemas.microsoft.com/office/drawing/2014/main" id="{8EB59AEB-EADC-403C-9DCF-C7B8A68FC5E6}"/>
+              </a:ext>
+            </a:extLst>
+          </p:cNvPr>
+          <p:cNvSpPr/>
+          <p:nvPr/>
+        </p:nvSpPr>
+        <p:spPr>
+          <a:xfrm rot="5400000">
+            <a:off x="1727904" y="527722"/>
+            <a:ext cx="141163" cy="634719"/>
+          </a:xfrm>
+          <a:prstGeom prst="downArrow">
+            <a:avLst/>
+          </a:prstGeom>
+          <a:noFill/>
+          <a:ln w="38100">
+            <a:solidFill>
+              <a:schemeClr val="tx1"/>
+            </a:solidFill>
+          </a:ln>
+        </p:spPr>
+        <p:style>
+          <a:lnRef idx="2">
+            <a:schemeClr val="accent1">
+              <a:shade val="50000"/>
+            </a:schemeClr>
+          </a:lnRef>
+          <a:fillRef idx="1">
+            <a:schemeClr val="accent1"/>
+          </a:fillRef>
+          <a:effectRef idx="0">
+            <a:schemeClr val="accent1"/>
+          </a:effectRef>
+          <a:fontRef idx="minor">
+            <a:schemeClr val="lt1"/>
+          </a:fontRef>
+        </p:style>
+        <p:txBody>
+          <a:bodyPr rtlCol="0" anchor="ctr"/>
+          <a:lstStyle/>
+          <a:p>
+            <a:pPr algn="ctr"/>
+            <a:endParaRPr lang="en-SG"/>
+          </a:p>
+        </p:txBody>
+      </p:sp>
+      <p:sp>
+        <p:nvSpPr>
+          <p:cNvPr id="24" name="TextBox 8">
+            <a:extLst>
+              <a:ext uri="{FF2B5EF4-FFF2-40B4-BE49-F238E27FC236}">
+                <a16:creationId xmlns:a16="http://schemas.microsoft.com/office/drawing/2014/main" id="{20990FD0-5350-4F70-B284-CF2ED3D2AB96}"/>
+              </a:ext>
+            </a:extLst>
+          </p:cNvPr>
+          <p:cNvSpPr txBox="1"/>
+          <p:nvPr/>
+        </p:nvSpPr>
+        <p:spPr>
+          <a:xfrm>
+            <a:off x="2118606" y="659807"/>
+            <a:ext cx="1114216" cy="369332"/>
+          </a:xfrm>
+          <a:prstGeom prst="rect">
+            <a:avLst/>
+          </a:prstGeom>
+          <a:noFill/>
+        </p:spPr>
+        <p:txBody>
+          <a:bodyPr wrap="none" rtlCol="0">
+            <a:spAutoFit/>
+          </a:bodyPr>
+          <a:lstStyle/>
+          <a:p>
+            <a:pPr algn="ctr"/>
+            <a:r>
+              <a:rPr lang="en-US" altLang="zh-CN" b="1" dirty="0"/>
+              <a:t>Repo Link</a:t>
+            </a:r>
+            <a:endParaRPr lang="en-SG" b="1" dirty="0"/>
           </a:p>
         </p:txBody>
       </p:sp>

</xml_diff>

<commit_message>
Update diagram in User Guide
</commit_message>
<xml_diff>
--- a/docs/diagrams/ug-report.pptx
+++ b/docs/diagrams/ug-report.pptx
@@ -261,7 +261,7 @@
           <a:p>
             <a:fld id="{D5F4EE06-143D-4C2F-8831-1CDA21FFE47B}" type="datetimeFigureOut">
               <a:rPr lang="en-SG" smtClean="0"/>
-              <a:t>23/1/2019</a:t>
+              <a:t>2/3/19</a:t>
             </a:fld>
             <a:endParaRPr lang="en-SG"/>
           </a:p>
@@ -461,7 +461,7 @@
           <a:p>
             <a:fld id="{D5F4EE06-143D-4C2F-8831-1CDA21FFE47B}" type="datetimeFigureOut">
               <a:rPr lang="en-SG" smtClean="0"/>
-              <a:t>23/1/2019</a:t>
+              <a:t>2/3/19</a:t>
             </a:fld>
             <a:endParaRPr lang="en-SG"/>
           </a:p>
@@ -671,7 +671,7 @@
           <a:p>
             <a:fld id="{D5F4EE06-143D-4C2F-8831-1CDA21FFE47B}" type="datetimeFigureOut">
               <a:rPr lang="en-SG" smtClean="0"/>
-              <a:t>23/1/2019</a:t>
+              <a:t>2/3/19</a:t>
             </a:fld>
             <a:endParaRPr lang="en-SG"/>
           </a:p>
@@ -871,7 +871,7 @@
           <a:p>
             <a:fld id="{D5F4EE06-143D-4C2F-8831-1CDA21FFE47B}" type="datetimeFigureOut">
               <a:rPr lang="en-SG" smtClean="0"/>
-              <a:t>23/1/2019</a:t>
+              <a:t>2/3/19</a:t>
             </a:fld>
             <a:endParaRPr lang="en-SG"/>
           </a:p>
@@ -1147,7 +1147,7 @@
           <a:p>
             <a:fld id="{D5F4EE06-143D-4C2F-8831-1CDA21FFE47B}" type="datetimeFigureOut">
               <a:rPr lang="en-SG" smtClean="0"/>
-              <a:t>23/1/2019</a:t>
+              <a:t>2/3/19</a:t>
             </a:fld>
             <a:endParaRPr lang="en-SG"/>
           </a:p>
@@ -1415,7 +1415,7 @@
           <a:p>
             <a:fld id="{D5F4EE06-143D-4C2F-8831-1CDA21FFE47B}" type="datetimeFigureOut">
               <a:rPr lang="en-SG" smtClean="0"/>
-              <a:t>23/1/2019</a:t>
+              <a:t>2/3/19</a:t>
             </a:fld>
             <a:endParaRPr lang="en-SG"/>
           </a:p>
@@ -1830,7 +1830,7 @@
           <a:p>
             <a:fld id="{D5F4EE06-143D-4C2F-8831-1CDA21FFE47B}" type="datetimeFigureOut">
               <a:rPr lang="en-SG" smtClean="0"/>
-              <a:t>23/1/2019</a:t>
+              <a:t>2/3/19</a:t>
             </a:fld>
             <a:endParaRPr lang="en-SG"/>
           </a:p>
@@ -1972,7 +1972,7 @@
           <a:p>
             <a:fld id="{D5F4EE06-143D-4C2F-8831-1CDA21FFE47B}" type="datetimeFigureOut">
               <a:rPr lang="en-SG" smtClean="0"/>
-              <a:t>23/1/2019</a:t>
+              <a:t>2/3/19</a:t>
             </a:fld>
             <a:endParaRPr lang="en-SG"/>
           </a:p>
@@ -2085,7 +2085,7 @@
           <a:p>
             <a:fld id="{D5F4EE06-143D-4C2F-8831-1CDA21FFE47B}" type="datetimeFigureOut">
               <a:rPr lang="en-SG" smtClean="0"/>
-              <a:t>23/1/2019</a:t>
+              <a:t>2/3/19</a:t>
             </a:fld>
             <a:endParaRPr lang="en-SG"/>
           </a:p>
@@ -2398,7 +2398,7 @@
           <a:p>
             <a:fld id="{D5F4EE06-143D-4C2F-8831-1CDA21FFE47B}" type="datetimeFigureOut">
               <a:rPr lang="en-SG" smtClean="0"/>
-              <a:t>23/1/2019</a:t>
+              <a:t>2/3/19</a:t>
             </a:fld>
             <a:endParaRPr lang="en-SG"/>
           </a:p>
@@ -2687,7 +2687,7 @@
           <a:p>
             <a:fld id="{D5F4EE06-143D-4C2F-8831-1CDA21FFE47B}" type="datetimeFigureOut">
               <a:rPr lang="en-SG" smtClean="0"/>
-              <a:t>23/1/2019</a:t>
+              <a:t>2/3/19</a:t>
             </a:fld>
             <a:endParaRPr lang="en-SG"/>
           </a:p>
@@ -2930,7 +2930,7 @@
           <a:p>
             <a:fld id="{D5F4EE06-143D-4C2F-8831-1CDA21FFE47B}" type="datetimeFigureOut">
               <a:rPr lang="en-SG" smtClean="0"/>
-              <a:t>23/1/2019</a:t>
+              <a:t>2/3/19</a:t>
             </a:fld>
             <a:endParaRPr lang="en-SG"/>
           </a:p>
@@ -3349,10 +3349,10 @@
       </p:grpSpPr>
       <p:pic>
         <p:nvPicPr>
-          <p:cNvPr id="3" name="图片 2">
-            <a:extLst>
-              <a:ext uri="{FF2B5EF4-FFF2-40B4-BE49-F238E27FC236}">
-                <a16:creationId xmlns:a16="http://schemas.microsoft.com/office/drawing/2014/main" id="{078C2DC3-05AE-4DBC-A6D6-2BF0D2EFA39D}"/>
+          <p:cNvPr id="25" name="Picture 24">
+            <a:extLst>
+              <a:ext uri="{FF2B5EF4-FFF2-40B4-BE49-F238E27FC236}">
+                <a16:creationId xmlns:a16="http://schemas.microsoft.com/office/drawing/2014/main" id="{61B9624A-61A2-274A-863A-57ED7C657D77}"/>
               </a:ext>
             </a:extLst>
           </p:cNvPr>
@@ -3375,8 +3375,8 @@
         </p:blipFill>
         <p:spPr>
           <a:xfrm>
-            <a:off x="528187" y="-2040"/>
-            <a:ext cx="9534617" cy="4689403"/>
+            <a:off x="1853224" y="1084133"/>
+            <a:ext cx="9487249" cy="4671748"/>
           </a:xfrm>
           <a:prstGeom prst="rect">
             <a:avLst/>
@@ -3397,7 +3397,7 @@
         </p:nvSpPr>
         <p:spPr>
           <a:xfrm>
-            <a:off x="4532800" y="1714711"/>
+            <a:off x="5726346" y="2980389"/>
             <a:ext cx="739306" cy="369332"/>
           </a:xfrm>
           <a:prstGeom prst="rect">
@@ -3433,7 +3433,7 @@
         </p:nvSpPr>
         <p:spPr>
           <a:xfrm>
-            <a:off x="7530269" y="-591128"/>
+            <a:off x="8812991" y="537332"/>
             <a:ext cx="517237" cy="554182"/>
           </a:xfrm>
           <a:prstGeom prst="downArrow">
@@ -3485,7 +3485,7 @@
         </p:nvSpPr>
         <p:spPr>
           <a:xfrm>
-            <a:off x="7164200" y="-960460"/>
+            <a:off x="8446922" y="168000"/>
             <a:ext cx="1249381" cy="369332"/>
           </a:xfrm>
           <a:prstGeom prst="rect">
@@ -3521,7 +3521,7 @@
         </p:nvSpPr>
         <p:spPr>
           <a:xfrm rot="5400000">
-            <a:off x="1699109" y="3673304"/>
+            <a:off x="2976778" y="4990040"/>
             <a:ext cx="517237" cy="554182"/>
           </a:xfrm>
           <a:prstGeom prst="downArrow">
@@ -3573,7 +3573,7 @@
         </p:nvSpPr>
         <p:spPr>
           <a:xfrm>
-            <a:off x="2271366" y="3766376"/>
+            <a:off x="3549035" y="5083112"/>
             <a:ext cx="1777538" cy="369332"/>
           </a:xfrm>
           <a:prstGeom prst="rect">
@@ -3609,7 +3609,7 @@
         </p:nvSpPr>
         <p:spPr>
           <a:xfrm rot="10800000">
-            <a:off x="4643835" y="1179832"/>
+            <a:off x="5837381" y="2445510"/>
             <a:ext cx="517237" cy="554182"/>
           </a:xfrm>
           <a:prstGeom prst="downArrow">
@@ -3661,7 +3661,7 @@
         </p:nvSpPr>
         <p:spPr>
           <a:xfrm>
-            <a:off x="-926499" y="181582"/>
+            <a:off x="370563" y="1384289"/>
             <a:ext cx="900503" cy="369332"/>
           </a:xfrm>
           <a:prstGeom prst="rect">
@@ -3697,7 +3697,7 @@
         </p:nvSpPr>
         <p:spPr>
           <a:xfrm rot="16200000">
-            <a:off x="-7523" y="124097"/>
+            <a:off x="1289539" y="1326804"/>
             <a:ext cx="517237" cy="554182"/>
           </a:xfrm>
           <a:prstGeom prst="downArrow">
@@ -3749,7 +3749,7 @@
         </p:nvSpPr>
         <p:spPr>
           <a:xfrm>
-            <a:off x="2561512" y="-601935"/>
+            <a:off x="3820806" y="563075"/>
             <a:ext cx="517237" cy="554182"/>
           </a:xfrm>
           <a:prstGeom prst="downArrow">
@@ -3801,7 +3801,7 @@
         </p:nvSpPr>
         <p:spPr>
           <a:xfrm>
-            <a:off x="2177009" y="-971267"/>
+            <a:off x="3436303" y="193743"/>
             <a:ext cx="1286250" cy="369332"/>
           </a:xfrm>
           <a:prstGeom prst="rect">
@@ -3837,7 +3837,7 @@
         </p:nvSpPr>
         <p:spPr>
           <a:xfrm>
-            <a:off x="-1277669" y="1824977"/>
+            <a:off x="-42114" y="3191439"/>
             <a:ext cx="1313181" cy="369332"/>
           </a:xfrm>
           <a:prstGeom prst="rect">
@@ -3873,7 +3873,7 @@
         </p:nvSpPr>
         <p:spPr>
           <a:xfrm rot="16200000">
-            <a:off x="53985" y="1744806"/>
+            <a:off x="1289540" y="3111268"/>
             <a:ext cx="517237" cy="554182"/>
           </a:xfrm>
           <a:prstGeom prst="downArrow">
@@ -3924,9 +3924,9 @@
           <p:nvPr/>
         </p:nvSpPr>
         <p:spPr>
-          <a:xfrm>
-            <a:off x="9058710" y="181582"/>
-            <a:ext cx="165190" cy="618288"/>
+          <a:xfrm rot="10800000">
+            <a:off x="8861759" y="2412815"/>
+            <a:ext cx="175512" cy="369333"/>
           </a:xfrm>
           <a:prstGeom prst="downArrow">
             <a:avLst/>
@@ -3977,7 +3977,7 @@
         </p:nvSpPr>
         <p:spPr>
           <a:xfrm>
-            <a:off x="8432622" y="-279561"/>
+            <a:off x="8986369" y="2474630"/>
             <a:ext cx="1399614" cy="369332"/>
           </a:xfrm>
           <a:prstGeom prst="rect">
@@ -4014,7 +4014,7 @@
         </p:nvSpPr>
         <p:spPr>
           <a:xfrm rot="5400000">
-            <a:off x="9674863" y="579726"/>
+            <a:off x="9500604" y="2005755"/>
             <a:ext cx="141163" cy="634719"/>
           </a:xfrm>
           <a:prstGeom prst="downArrow">
@@ -4066,7 +4066,7 @@
         </p:nvSpPr>
         <p:spPr>
           <a:xfrm>
-            <a:off x="9225331" y="457172"/>
+            <a:off x="9916277" y="2138448"/>
             <a:ext cx="1318438" cy="369332"/>
           </a:xfrm>
           <a:prstGeom prst="rect">
@@ -4103,7 +4103,7 @@
         </p:nvSpPr>
         <p:spPr>
           <a:xfrm rot="5400000">
-            <a:off x="1727904" y="527722"/>
+            <a:off x="3276460" y="1801670"/>
             <a:ext cx="141163" cy="634719"/>
           </a:xfrm>
           <a:prstGeom prst="downArrow">
@@ -4155,7 +4155,7 @@
         </p:nvSpPr>
         <p:spPr>
           <a:xfrm>
-            <a:off x="2118606" y="659807"/>
+            <a:off x="3667162" y="1933755"/>
             <a:ext cx="1114216" cy="369332"/>
           </a:xfrm>
           <a:prstGeom prst="rect">
@@ -4173,6 +4173,95 @@
             <a:r>
               <a:rPr lang="en-US" altLang="zh-CN" b="1" dirty="0"/>
               <a:t>Repo Link</a:t>
+            </a:r>
+            <a:endParaRPr lang="en-SG" b="1" dirty="0"/>
+          </a:p>
+        </p:txBody>
+      </p:sp>
+      <p:sp>
+        <p:nvSpPr>
+          <p:cNvPr id="26" name="Arrow: Down 7">
+            <a:extLst>
+              <a:ext uri="{FF2B5EF4-FFF2-40B4-BE49-F238E27FC236}">
+                <a16:creationId xmlns:a16="http://schemas.microsoft.com/office/drawing/2014/main" id="{3118F1AC-041A-AB4A-9D16-8F6C4DC3F00F}"/>
+              </a:ext>
+            </a:extLst>
+          </p:cNvPr>
+          <p:cNvSpPr/>
+          <p:nvPr/>
+        </p:nvSpPr>
+        <p:spPr>
+          <a:xfrm rot="5400000">
+            <a:off x="9116556" y="1633899"/>
+            <a:ext cx="141163" cy="634719"/>
+          </a:xfrm>
+          <a:prstGeom prst="downArrow">
+            <a:avLst/>
+          </a:prstGeom>
+          <a:noFill/>
+          <a:ln w="38100">
+            <a:solidFill>
+              <a:schemeClr val="tx1"/>
+            </a:solidFill>
+          </a:ln>
+        </p:spPr>
+        <p:style>
+          <a:lnRef idx="2">
+            <a:schemeClr val="accent1">
+              <a:shade val="50000"/>
+            </a:schemeClr>
+          </a:lnRef>
+          <a:fillRef idx="1">
+            <a:schemeClr val="accent1"/>
+          </a:fillRef>
+          <a:effectRef idx="0">
+            <a:schemeClr val="accent1"/>
+          </a:effectRef>
+          <a:fontRef idx="minor">
+            <a:schemeClr val="lt1"/>
+          </a:fontRef>
+        </p:style>
+        <p:txBody>
+          <a:bodyPr rtlCol="0" anchor="ctr"/>
+          <a:lstStyle/>
+          <a:p>
+            <a:pPr algn="ctr"/>
+            <a:endParaRPr lang="en-SG"/>
+          </a:p>
+        </p:txBody>
+      </p:sp>
+      <p:sp>
+        <p:nvSpPr>
+          <p:cNvPr id="27" name="TextBox 8">
+            <a:extLst>
+              <a:ext uri="{FF2B5EF4-FFF2-40B4-BE49-F238E27FC236}">
+                <a16:creationId xmlns:a16="http://schemas.microsoft.com/office/drawing/2014/main" id="{D6150353-FC46-3C42-A08B-60B437B51EAF}"/>
+              </a:ext>
+            </a:extLst>
+          </p:cNvPr>
+          <p:cNvSpPr txBox="1"/>
+          <p:nvPr/>
+        </p:nvSpPr>
+        <p:spPr>
+          <a:xfrm>
+            <a:off x="9504457" y="1763786"/>
+            <a:ext cx="1180516" cy="369332"/>
+          </a:xfrm>
+          <a:prstGeom prst="rect">
+            <a:avLst/>
+          </a:prstGeom>
+          <a:noFill/>
+        </p:spPr>
+        <p:txBody>
+          <a:bodyPr wrap="none" rtlCol="0">
+            <a:spAutoFit/>
+          </a:bodyPr>
+          <a:lstStyle/>
+          <a:p>
+            <a:pPr algn="ctr"/>
+            <a:r>
+              <a:rPr lang="en-US" altLang="zh-CN" b="1" dirty="0"/>
+              <a:t>Glob Filter</a:t>
             </a:r>
             <a:endParaRPr lang="en-SG" b="1" dirty="0"/>
           </a:p>

</xml_diff>